<commit_message>
Major upgrades to model, implemnted VGG style net.
</commit_message>
<xml_diff>
--- a/Documents/Poster.pptx
+++ b/Documents/Poster.pptx
@@ -243,7 +243,7 @@
           <a:p>
             <a:fld id="{8F5E9548-19BC-454A-9349-354AE2A93C1E}" type="datetimeFigureOut">
               <a:rPr lang="en-US" smtClean="0"/>
-              <a:t>4/28/19</a:t>
+              <a:t>4/30/19</a:t>
             </a:fld>
             <a:endParaRPr lang="en-US"/>
           </a:p>
@@ -413,7 +413,7 @@
           <a:p>
             <a:fld id="{8F5E9548-19BC-454A-9349-354AE2A93C1E}" type="datetimeFigureOut">
               <a:rPr lang="en-US" smtClean="0"/>
-              <a:t>4/28/19</a:t>
+              <a:t>4/30/19</a:t>
             </a:fld>
             <a:endParaRPr lang="en-US"/>
           </a:p>
@@ -593,7 +593,7 @@
           <a:p>
             <a:fld id="{8F5E9548-19BC-454A-9349-354AE2A93C1E}" type="datetimeFigureOut">
               <a:rPr lang="en-US" smtClean="0"/>
-              <a:t>4/28/19</a:t>
+              <a:t>4/30/19</a:t>
             </a:fld>
             <a:endParaRPr lang="en-US"/>
           </a:p>
@@ -763,7 +763,7 @@
           <a:p>
             <a:fld id="{8F5E9548-19BC-454A-9349-354AE2A93C1E}" type="datetimeFigureOut">
               <a:rPr lang="en-US" smtClean="0"/>
-              <a:t>4/28/19</a:t>
+              <a:t>4/30/19</a:t>
             </a:fld>
             <a:endParaRPr lang="en-US"/>
           </a:p>
@@ -1007,7 +1007,7 @@
           <a:p>
             <a:fld id="{8F5E9548-19BC-454A-9349-354AE2A93C1E}" type="datetimeFigureOut">
               <a:rPr lang="en-US" smtClean="0"/>
-              <a:t>4/28/19</a:t>
+              <a:t>4/30/19</a:t>
             </a:fld>
             <a:endParaRPr lang="en-US"/>
           </a:p>
@@ -1239,7 +1239,7 @@
           <a:p>
             <a:fld id="{8F5E9548-19BC-454A-9349-354AE2A93C1E}" type="datetimeFigureOut">
               <a:rPr lang="en-US" smtClean="0"/>
-              <a:t>4/28/19</a:t>
+              <a:t>4/30/19</a:t>
             </a:fld>
             <a:endParaRPr lang="en-US"/>
           </a:p>
@@ -1606,7 +1606,7 @@
           <a:p>
             <a:fld id="{8F5E9548-19BC-454A-9349-354AE2A93C1E}" type="datetimeFigureOut">
               <a:rPr lang="en-US" smtClean="0"/>
-              <a:t>4/28/19</a:t>
+              <a:t>4/30/19</a:t>
             </a:fld>
             <a:endParaRPr lang="en-US"/>
           </a:p>
@@ -1724,7 +1724,7 @@
           <a:p>
             <a:fld id="{8F5E9548-19BC-454A-9349-354AE2A93C1E}" type="datetimeFigureOut">
               <a:rPr lang="en-US" smtClean="0"/>
-              <a:t>4/28/19</a:t>
+              <a:t>4/30/19</a:t>
             </a:fld>
             <a:endParaRPr lang="en-US"/>
           </a:p>
@@ -1819,7 +1819,7 @@
           <a:p>
             <a:fld id="{8F5E9548-19BC-454A-9349-354AE2A93C1E}" type="datetimeFigureOut">
               <a:rPr lang="en-US" smtClean="0"/>
-              <a:t>4/28/19</a:t>
+              <a:t>4/30/19</a:t>
             </a:fld>
             <a:endParaRPr lang="en-US"/>
           </a:p>
@@ -2096,7 +2096,7 @@
           <a:p>
             <a:fld id="{8F5E9548-19BC-454A-9349-354AE2A93C1E}" type="datetimeFigureOut">
               <a:rPr lang="en-US" smtClean="0"/>
-              <a:t>4/28/19</a:t>
+              <a:t>4/30/19</a:t>
             </a:fld>
             <a:endParaRPr lang="en-US"/>
           </a:p>
@@ -2353,7 +2353,7 @@
           <a:p>
             <a:fld id="{8F5E9548-19BC-454A-9349-354AE2A93C1E}" type="datetimeFigureOut">
               <a:rPr lang="en-US" smtClean="0"/>
-              <a:t>4/28/19</a:t>
+              <a:t>4/30/19</a:t>
             </a:fld>
             <a:endParaRPr lang="en-US"/>
           </a:p>
@@ -2566,7 +2566,7 @@
           <a:p>
             <a:fld id="{8F5E9548-19BC-454A-9349-354AE2A93C1E}" type="datetimeFigureOut">
               <a:rPr lang="en-US" smtClean="0"/>
-              <a:t>4/28/19</a:t>
+              <a:t>4/30/19</a:t>
             </a:fld>
             <a:endParaRPr lang="en-US"/>
           </a:p>
@@ -2993,42 +2993,17 @@
         </p:blipFill>
         <p:spPr>
           <a:xfrm>
-            <a:off x="13155052" y="15555387"/>
-            <a:ext cx="7894028" cy="5920521"/>
+            <a:off x="12238504" y="15283375"/>
+            <a:ext cx="9144000" cy="6858000"/>
           </a:xfrm>
           <a:prstGeom prst="rect">
             <a:avLst/>
           </a:prstGeom>
-        </p:spPr>
-      </p:pic>
-      <p:pic>
-        <p:nvPicPr>
-          <p:cNvPr id="10" name="Picture 9">
-            <a:extLst>
-              <a:ext uri="{FF2B5EF4-FFF2-40B4-BE49-F238E27FC236}">
-                <a16:creationId xmlns:a16="http://schemas.microsoft.com/office/drawing/2014/main" id="{8D536DBB-201B-2E48-B1E4-0E9BB50FDF32}"/>
-              </a:ext>
-            </a:extLst>
-          </p:cNvPr>
-          <p:cNvPicPr>
-            <a:picLocks noChangeAspect="1"/>
-          </p:cNvPicPr>
-          <p:nvPr/>
-        </p:nvPicPr>
-        <p:blipFill>
-          <a:blip r:embed="rId3"/>
-          <a:stretch>
-            <a:fillRect/>
-          </a:stretch>
-        </p:blipFill>
-        <p:spPr>
-          <a:xfrm>
-            <a:off x="11887200" y="21475909"/>
-            <a:ext cx="10151385" cy="7613539"/>
-          </a:xfrm>
-          <a:prstGeom prst="rect">
-            <a:avLst/>
-          </a:prstGeom>
+          <a:ln w="38100">
+            <a:solidFill>
+              <a:schemeClr val="tx1"/>
+            </a:solidFill>
+          </a:ln>
         </p:spPr>
       </p:pic>
       <p:sp>
@@ -3145,16 +3120,16 @@
         </p:nvSpPr>
         <p:spPr>
           <a:xfrm>
-            <a:off x="2942104" y="4238347"/>
-            <a:ext cx="8945096" cy="7725192"/>
+            <a:off x="2835779" y="3840480"/>
+            <a:ext cx="9144000" cy="7725192"/>
           </a:xfrm>
           <a:prstGeom prst="rect">
             <a:avLst/>
           </a:prstGeom>
           <a:noFill/>
-          <a:ln>
+          <a:ln w="38100">
             <a:solidFill>
-              <a:schemeClr val="tx1"/>
+              <a:schemeClr val="accent1"/>
             </a:solidFill>
           </a:ln>
         </p:spPr>
@@ -3208,13 +3183,18 @@
         </p:nvSpPr>
         <p:spPr>
           <a:xfrm>
-            <a:off x="12238504" y="4304745"/>
-            <a:ext cx="8945096" cy="12649617"/>
+            <a:off x="12238504" y="3840480"/>
+            <a:ext cx="9144000" cy="11110734"/>
           </a:xfrm>
           <a:prstGeom prst="rect">
             <a:avLst/>
           </a:prstGeom>
           <a:noFill/>
+          <a:ln w="38100">
+            <a:solidFill>
+              <a:schemeClr val="tx1"/>
+            </a:solidFill>
+          </a:ln>
         </p:spPr>
         <p:txBody>
           <a:bodyPr wrap="square" rtlCol="0">
@@ -3234,7 +3214,7 @@
           </a:p>
           <a:p>
             <a:r>
-              <a:rPr lang="en-US" sz="4800" dirty="0"/>
+              <a:rPr lang="en-US" sz="4400" dirty="0"/>
               <a:t>The network consists of:</a:t>
             </a:r>
           </a:p>
@@ -3244,7 +3224,7 @@
               <a:buChar char="•"/>
             </a:pPr>
             <a:r>
-              <a:rPr lang="en-US" sz="4800" dirty="0"/>
+              <a:rPr lang="en-US" sz="4400" dirty="0"/>
               <a:t>Two “VGG style” convolutional ”pre-processing” layers</a:t>
             </a:r>
           </a:p>
@@ -3254,7 +3234,7 @@
               <a:buChar char="•"/>
             </a:pPr>
             <a:r>
-              <a:rPr lang="en-US" sz="4800" dirty="0"/>
+              <a:rPr lang="en-US" sz="4400" dirty="0"/>
               <a:t>A branch of two convolutional layers that represent projections along the frequency and range axes</a:t>
             </a:r>
           </a:p>
@@ -3264,24 +3244,24 @@
               <a:buChar char="•"/>
             </a:pPr>
             <a:r>
-              <a:rPr lang="en-US" sz="4800" dirty="0"/>
+              <a:rPr lang="en-US" sz="4400" dirty="0"/>
               <a:t>Two fully connected layers as a classifier</a:t>
             </a:r>
           </a:p>
           <a:p>
-            <a:endParaRPr lang="en-US" sz="4800" dirty="0"/>
-          </a:p>
-          <a:p>
-            <a:r>
-              <a:rPr lang="en-US" sz="4800" dirty="0"/>
+            <a:endParaRPr lang="en-US" sz="4400" dirty="0"/>
+          </a:p>
+          <a:p>
+            <a:r>
+              <a:rPr lang="en-US" sz="4400" dirty="0"/>
               <a:t>I used an MSE error model rather than </a:t>
             </a:r>
             <a:r>
-              <a:rPr lang="en-US" sz="4800" dirty="0" err="1"/>
+              <a:rPr lang="en-US" sz="4400" dirty="0" err="1"/>
               <a:t>SoftMAX</a:t>
             </a:r>
             <a:r>
-              <a:rPr lang="en-US" sz="4800" dirty="0"/>
+              <a:rPr lang="en-US" sz="4400" dirty="0"/>
               <a:t> because there can be targets in multiple bins. Training was with SGD</a:t>
             </a:r>
           </a:p>
@@ -3340,13 +3320,18 @@
         </p:nvSpPr>
         <p:spPr>
           <a:xfrm>
-            <a:off x="30374104" y="4364532"/>
-            <a:ext cx="8945096" cy="10433625"/>
+            <a:off x="31549763" y="3842016"/>
+            <a:ext cx="9144000" cy="9017853"/>
           </a:xfrm>
           <a:prstGeom prst="rect">
             <a:avLst/>
           </a:prstGeom>
           <a:noFill/>
+          <a:ln w="38100">
+            <a:solidFill>
+              <a:schemeClr val="accent1"/>
+            </a:solidFill>
+          </a:ln>
         </p:spPr>
         <p:txBody>
           <a:bodyPr wrap="square" rtlCol="0">
@@ -3356,44 +3341,44 @@
           <a:p>
             <a:pPr algn="ctr"/>
             <a:r>
-              <a:rPr lang="en-US" sz="4800" dirty="0"/>
+              <a:rPr lang="en-US" sz="4800" b="1" u="sng" dirty="0"/>
               <a:t>Training</a:t>
             </a:r>
           </a:p>
           <a:p>
             <a:pPr algn="ctr"/>
-            <a:endParaRPr lang="en-US" sz="4800" dirty="0"/>
-          </a:p>
-          <a:p>
-            <a:r>
-              <a:rPr lang="en-US" sz="4800" dirty="0"/>
+            <a:endParaRPr lang="en-US" sz="4400" dirty="0"/>
+          </a:p>
+          <a:p>
+            <a:r>
+              <a:rPr lang="en-US" sz="4400" dirty="0"/>
               <a:t>25,000 total samples</a:t>
             </a:r>
           </a:p>
           <a:p>
             <a:r>
-              <a:rPr lang="en-US" sz="4800" dirty="0"/>
+              <a:rPr lang="en-US" sz="4400" dirty="0"/>
               <a:t>	15,000 training</a:t>
             </a:r>
           </a:p>
           <a:p>
             <a:r>
-              <a:rPr lang="en-US" sz="4800" dirty="0"/>
+              <a:rPr lang="en-US" sz="4400" dirty="0"/>
               <a:t>	5,000 validation</a:t>
             </a:r>
           </a:p>
           <a:p>
             <a:r>
-              <a:rPr lang="en-US" sz="4800" dirty="0"/>
+              <a:rPr lang="en-US" sz="4400" dirty="0"/>
               <a:t>	5,000 test</a:t>
             </a:r>
           </a:p>
           <a:p>
-            <a:endParaRPr lang="en-US" sz="4800" dirty="0"/>
-          </a:p>
-          <a:p>
-            <a:r>
-              <a:rPr lang="en-US" sz="4800" dirty="0"/>
+            <a:endParaRPr lang="en-US" sz="4400" dirty="0"/>
+          </a:p>
+          <a:p>
+            <a:r>
+              <a:rPr lang="en-US" sz="4400" dirty="0"/>
               <a:t>Each training sample differs in:</a:t>
             </a:r>
           </a:p>
@@ -3403,7 +3388,7 @@
               <a:buChar char="•"/>
             </a:pPr>
             <a:r>
-              <a:rPr lang="en-US" sz="4800" dirty="0"/>
+              <a:rPr lang="en-US" sz="4400" dirty="0"/>
               <a:t>Target presence, location, speed</a:t>
             </a:r>
           </a:p>
@@ -3413,7 +3398,7 @@
               <a:buChar char="•"/>
             </a:pPr>
             <a:r>
-              <a:rPr lang="en-US" sz="4800" dirty="0"/>
+              <a:rPr lang="en-US" sz="4400" dirty="0"/>
               <a:t>Decoy presence, location, doppler</a:t>
             </a:r>
           </a:p>
@@ -3423,7 +3408,7 @@
               <a:buChar char="•"/>
             </a:pPr>
             <a:r>
-              <a:rPr lang="en-US" sz="4800" dirty="0"/>
+              <a:rPr lang="en-US" sz="4400" dirty="0"/>
               <a:t>Water depth, wind speed, bottom type, volume scattering</a:t>
             </a:r>
           </a:p>
@@ -3446,14 +3431,14 @@
         </p:nvSpPr>
         <p:spPr>
           <a:xfrm>
-            <a:off x="2855535" y="12328892"/>
-            <a:ext cx="8945096" cy="13203615"/>
+            <a:off x="2855535" y="11698689"/>
+            <a:ext cx="9144000" cy="17820263"/>
           </a:xfrm>
           <a:prstGeom prst="rect">
             <a:avLst/>
           </a:prstGeom>
           <a:noFill/>
-          <a:ln>
+          <a:ln w="38100">
             <a:solidFill>
               <a:schemeClr val="tx1"/>
             </a:solidFill>
@@ -3549,168 +3534,54 @@
             </a:r>
           </a:p>
           <a:p>
-            <a:endParaRPr lang="en-US" sz="4800" dirty="0"/>
-          </a:p>
-          <a:p>
-            <a:endParaRPr lang="en-US" sz="4800" dirty="0"/>
-          </a:p>
-        </p:txBody>
-      </p:sp>
-      <p:sp>
-        <p:nvSpPr>
-          <p:cNvPr id="12" name="TextBox 11">
-            <a:extLst>
-              <a:ext uri="{FF2B5EF4-FFF2-40B4-BE49-F238E27FC236}">
-                <a16:creationId xmlns:a16="http://schemas.microsoft.com/office/drawing/2014/main" id="{8BCD52AA-C370-9A46-B16F-5428BC2294D0}"/>
-              </a:ext>
-            </a:extLst>
-          </p:cNvPr>
-          <p:cNvSpPr txBox="1"/>
-          <p:nvPr/>
-        </p:nvSpPr>
-        <p:spPr>
-          <a:xfrm>
-            <a:off x="15618455" y="25962531"/>
-            <a:ext cx="914400" cy="369332"/>
-          </a:xfrm>
-          <a:prstGeom prst="rect">
-            <a:avLst/>
-          </a:prstGeom>
-          <a:noFill/>
-        </p:spPr>
-        <p:txBody>
-          <a:bodyPr wrap="square" rtlCol="0">
-            <a:spAutoFit/>
-          </a:bodyPr>
-          <a:lstStyle/>
-          <a:p>
-            <a:r>
-              <a:rPr lang="en-US" b="1" dirty="0"/>
-              <a:t>Target</a:t>
-            </a:r>
-          </a:p>
-        </p:txBody>
-      </p:sp>
-      <p:cxnSp>
-        <p:nvCxnSpPr>
-          <p:cNvPr id="13" name="Straight Arrow Connector 12">
-            <a:extLst>
-              <a:ext uri="{FF2B5EF4-FFF2-40B4-BE49-F238E27FC236}">
-                <a16:creationId xmlns:a16="http://schemas.microsoft.com/office/drawing/2014/main" id="{C88CD9CE-3305-7141-A1D9-F5B6E9768D96}"/>
-              </a:ext>
-            </a:extLst>
-          </p:cNvPr>
-          <p:cNvCxnSpPr>
-            <a:cxnSpLocks/>
-          </p:cNvCxnSpPr>
-          <p:nvPr/>
-        </p:nvCxnSpPr>
-        <p:spPr>
-          <a:xfrm flipH="1" flipV="1">
-            <a:off x="15367001" y="25476200"/>
-            <a:ext cx="431799" cy="486330"/>
-          </a:xfrm>
-          <a:prstGeom prst="straightConnector1">
-            <a:avLst/>
-          </a:prstGeom>
-          <a:ln w="19050">
-            <a:tailEnd type="triangle"/>
-          </a:ln>
-        </p:spPr>
-        <p:style>
-          <a:lnRef idx="1">
-            <a:schemeClr val="accent1"/>
-          </a:lnRef>
-          <a:fillRef idx="0">
-            <a:schemeClr val="accent1"/>
-          </a:fillRef>
-          <a:effectRef idx="0">
-            <a:schemeClr val="accent1"/>
-          </a:effectRef>
-          <a:fontRef idx="minor">
-            <a:schemeClr val="tx1"/>
-          </a:fontRef>
-        </p:style>
-      </p:cxnSp>
-      <p:sp>
-        <p:nvSpPr>
-          <p:cNvPr id="23" name="TextBox 22">
-            <a:extLst>
-              <a:ext uri="{FF2B5EF4-FFF2-40B4-BE49-F238E27FC236}">
-                <a16:creationId xmlns:a16="http://schemas.microsoft.com/office/drawing/2014/main" id="{0ADD9D1D-85C7-2D4A-AC5C-4C0074D0124D}"/>
-              </a:ext>
-            </a:extLst>
-          </p:cNvPr>
-          <p:cNvSpPr txBox="1"/>
-          <p:nvPr/>
-        </p:nvSpPr>
-        <p:spPr>
-          <a:xfrm>
-            <a:off x="14452601" y="23701931"/>
-            <a:ext cx="914400" cy="369332"/>
-          </a:xfrm>
-          <a:prstGeom prst="rect">
-            <a:avLst/>
-          </a:prstGeom>
-          <a:noFill/>
-        </p:spPr>
-        <p:txBody>
-          <a:bodyPr wrap="square" rtlCol="0">
-            <a:spAutoFit/>
-          </a:bodyPr>
-          <a:lstStyle/>
-          <a:p>
-            <a:r>
-              <a:rPr lang="en-US" b="1" dirty="0"/>
-              <a:t>Surface</a:t>
-            </a:r>
-          </a:p>
-        </p:txBody>
-      </p:sp>
-      <p:cxnSp>
-        <p:nvCxnSpPr>
-          <p:cNvPr id="24" name="Straight Arrow Connector 23">
-            <a:extLst>
-              <a:ext uri="{FF2B5EF4-FFF2-40B4-BE49-F238E27FC236}">
-                <a16:creationId xmlns:a16="http://schemas.microsoft.com/office/drawing/2014/main" id="{CEEA0544-98EA-DA4C-8638-855EF8183540}"/>
-              </a:ext>
-            </a:extLst>
-          </p:cNvPr>
-          <p:cNvCxnSpPr>
-            <a:cxnSpLocks/>
-          </p:cNvCxnSpPr>
-          <p:nvPr/>
-        </p:nvCxnSpPr>
-        <p:spPr>
-          <a:xfrm flipH="1">
-            <a:off x="13977611" y="24162266"/>
-            <a:ext cx="528322" cy="729734"/>
-          </a:xfrm>
-          <a:prstGeom prst="straightConnector1">
-            <a:avLst/>
-          </a:prstGeom>
-          <a:ln w="19050">
-            <a:solidFill>
-              <a:schemeClr val="accent1"/>
-            </a:solidFill>
-            <a:tailEnd type="triangle"/>
-          </a:ln>
-        </p:spPr>
-        <p:style>
-          <a:lnRef idx="1">
-            <a:schemeClr val="accent1"/>
-          </a:lnRef>
-          <a:fillRef idx="0">
-            <a:schemeClr val="accent1"/>
-          </a:fillRef>
-          <a:effectRef idx="0">
-            <a:schemeClr val="accent1"/>
-          </a:effectRef>
-          <a:fontRef idx="minor">
-            <a:schemeClr val="tx1"/>
-          </a:fontRef>
-        </p:style>
-      </p:cxnSp>
+            <a:pPr marL="685800" indent="-685800">
+              <a:buFont typeface="Arial" panose="020B0604020202020204" pitchFamily="34" charset="0"/>
+              <a:buChar char="•"/>
+            </a:pPr>
+            <a:endParaRPr lang="en-US" sz="4400" dirty="0"/>
+          </a:p>
+          <a:p>
+            <a:r>
+              <a:rPr lang="en-US" sz="4400" dirty="0"/>
+              <a:t>A simulation was used to generate training, validation, and test data with random</a:t>
+            </a:r>
+            <a:br>
+              <a:rPr lang="en-US" sz="4400" dirty="0"/>
+            </a:br>
+            <a:endParaRPr lang="en-US" sz="4400" dirty="0"/>
+          </a:p>
+          <a:p>
+            <a:pPr marL="685800" indent="-685800">
+              <a:buFont typeface="Arial" panose="020B0604020202020204" pitchFamily="34" charset="0"/>
+              <a:buChar char="•"/>
+            </a:pPr>
+            <a:r>
+              <a:rPr lang="en-US" sz="4400" dirty="0"/>
+              <a:t>Target presence, location, speed</a:t>
+            </a:r>
+          </a:p>
+          <a:p>
+            <a:pPr marL="685800" indent="-685800">
+              <a:buFont typeface="Arial" panose="020B0604020202020204" pitchFamily="34" charset="0"/>
+              <a:buChar char="•"/>
+            </a:pPr>
+            <a:r>
+              <a:rPr lang="en-US" sz="4400" dirty="0"/>
+              <a:t>Decoy presence, location, doppler</a:t>
+            </a:r>
+          </a:p>
+          <a:p>
+            <a:pPr marL="685800" indent="-685800">
+              <a:buFont typeface="Arial" panose="020B0604020202020204" pitchFamily="34" charset="0"/>
+              <a:buChar char="•"/>
+            </a:pPr>
+            <a:r>
+              <a:rPr lang="en-US" sz="4400" dirty="0"/>
+              <a:t>Water depth, wind speed, bottom type, volume scattering</a:t>
+            </a:r>
+          </a:p>
+        </p:txBody>
+      </p:sp>
       <p:sp>
         <p:nvSpPr>
           <p:cNvPr id="28" name="Rectangle 27">
@@ -4516,21 +4387,666 @@
           <p:nvPr/>
         </p:nvPicPr>
         <p:blipFill>
-          <a:blip r:embed="rId4"/>
+          <a:blip r:embed="rId3"/>
           <a:stretch>
             <a:fillRect/>
           </a:stretch>
         </p:blipFill>
         <p:spPr>
           <a:xfrm>
-            <a:off x="29167816" y="14940856"/>
-            <a:ext cx="10151384" cy="7613538"/>
+            <a:off x="31549763" y="16198420"/>
+            <a:ext cx="9144000" cy="6858000"/>
           </a:xfrm>
           <a:prstGeom prst="rect">
             <a:avLst/>
           </a:prstGeom>
+          <a:ln w="38100">
+            <a:solidFill>
+              <a:schemeClr val="accent1">
+                <a:shade val="50000"/>
+              </a:schemeClr>
+            </a:solidFill>
+          </a:ln>
         </p:spPr>
       </p:pic>
+      <p:sp>
+        <p:nvSpPr>
+          <p:cNvPr id="3" name="TextBox 2">
+            <a:extLst>
+              <a:ext uri="{FF2B5EF4-FFF2-40B4-BE49-F238E27FC236}">
+                <a16:creationId xmlns:a16="http://schemas.microsoft.com/office/drawing/2014/main" id="{39863B28-3CE8-BB44-A89E-C6374B05E2C8}"/>
+              </a:ext>
+            </a:extLst>
+          </p:cNvPr>
+          <p:cNvSpPr txBox="1"/>
+          <p:nvPr/>
+        </p:nvSpPr>
+        <p:spPr>
+          <a:xfrm>
+            <a:off x="21879786" y="18532105"/>
+            <a:ext cx="9144000" cy="4524315"/>
+          </a:xfrm>
+          <a:prstGeom prst="rect">
+            <a:avLst/>
+          </a:prstGeom>
+          <a:noFill/>
+          <a:ln w="38100">
+            <a:solidFill>
+              <a:schemeClr val="accent1">
+                <a:shade val="50000"/>
+              </a:schemeClr>
+            </a:solidFill>
+          </a:ln>
+        </p:spPr>
+        <p:txBody>
+          <a:bodyPr wrap="square" rtlCol="0">
+            <a:spAutoFit/>
+          </a:bodyPr>
+          <a:lstStyle/>
+          <a:p>
+            <a:pPr algn="ctr"/>
+            <a:r>
+              <a:rPr lang="en-US" sz="4800" b="1" dirty="0"/>
+              <a:t>Detector Performance</a:t>
+            </a:r>
+          </a:p>
+          <a:p>
+            <a:pPr algn="ctr"/>
+            <a:endParaRPr lang="en-US" sz="4800" b="1" dirty="0"/>
+          </a:p>
+          <a:p>
+            <a:r>
+              <a:rPr lang="en-US" sz="4800" dirty="0"/>
+              <a:t>Detector performance of both decoy and real were compared to SOA split window normalizer </a:t>
+            </a:r>
+          </a:p>
+        </p:txBody>
+      </p:sp>
+      <p:graphicFrame>
+        <p:nvGraphicFramePr>
+          <p:cNvPr id="5" name="Table 4">
+            <a:extLst>
+              <a:ext uri="{FF2B5EF4-FFF2-40B4-BE49-F238E27FC236}">
+                <a16:creationId xmlns:a16="http://schemas.microsoft.com/office/drawing/2014/main" id="{0F4DB3BB-C768-6444-86D6-1DE68E26FEA7}"/>
+              </a:ext>
+            </a:extLst>
+          </p:cNvPr>
+          <p:cNvGraphicFramePr>
+            <a:graphicFrameLocks noGrp="1"/>
+          </p:cNvGraphicFramePr>
+          <p:nvPr>
+            <p:extLst>
+              <p:ext uri="{D42A27DB-BD31-4B8C-83A1-F6EECF244321}">
+                <p14:modId xmlns:p14="http://schemas.microsoft.com/office/powerpoint/2010/main" val="3039439956"/>
+              </p:ext>
+            </p:extLst>
+          </p:nvPr>
+        </p:nvGraphicFramePr>
+        <p:xfrm>
+          <a:off x="23301986" y="23886597"/>
+          <a:ext cx="15159964" cy="4857684"/>
+        </p:xfrm>
+        <a:graphic>
+          <a:graphicData uri="http://schemas.openxmlformats.org/drawingml/2006/table">
+            <a:tbl>
+              <a:tblPr firstRow="1" bandRow="1">
+                <a:tableStyleId>{5C22544A-7EE6-4342-B048-85BDC9FD1C3A}</a:tableStyleId>
+              </a:tblPr>
+              <a:tblGrid>
+                <a:gridCol w="3789991">
+                  <a:extLst>
+                    <a:ext uri="{9D8B030D-6E8A-4147-A177-3AD203B41FA5}">
+                      <a16:colId xmlns:a16="http://schemas.microsoft.com/office/drawing/2014/main" val="1719164077"/>
+                    </a:ext>
+                  </a:extLst>
+                </a:gridCol>
+                <a:gridCol w="3789991">
+                  <a:extLst>
+                    <a:ext uri="{9D8B030D-6E8A-4147-A177-3AD203B41FA5}">
+                      <a16:colId xmlns:a16="http://schemas.microsoft.com/office/drawing/2014/main" val="3676199173"/>
+                    </a:ext>
+                  </a:extLst>
+                </a:gridCol>
+                <a:gridCol w="3789991">
+                  <a:extLst>
+                    <a:ext uri="{9D8B030D-6E8A-4147-A177-3AD203B41FA5}">
+                      <a16:colId xmlns:a16="http://schemas.microsoft.com/office/drawing/2014/main" val="3513467562"/>
+                    </a:ext>
+                  </a:extLst>
+                </a:gridCol>
+                <a:gridCol w="3789991">
+                  <a:extLst>
+                    <a:ext uri="{9D8B030D-6E8A-4147-A177-3AD203B41FA5}">
+                      <a16:colId xmlns:a16="http://schemas.microsoft.com/office/drawing/2014/main" val="2436583933"/>
+                    </a:ext>
+                  </a:extLst>
+                </a:gridCol>
+              </a:tblGrid>
+              <a:tr h="1468722">
+                <a:tc>
+                  <a:txBody>
+                    <a:bodyPr/>
+                    <a:lstStyle/>
+                    <a:p>
+                      <a:endParaRPr lang="en-US" sz="6000" dirty="0"/>
+                    </a:p>
+                  </a:txBody>
+                  <a:tcPr/>
+                </a:tc>
+                <a:tc>
+                  <a:txBody>
+                    <a:bodyPr/>
+                    <a:lstStyle/>
+                    <a:p>
+                      <a:r>
+                        <a:rPr lang="en-US" sz="6000" dirty="0"/>
+                        <a:t>True</a:t>
+                      </a:r>
+                    </a:p>
+                  </a:txBody>
+                  <a:tcPr/>
+                </a:tc>
+                <a:tc>
+                  <a:txBody>
+                    <a:bodyPr/>
+                    <a:lstStyle/>
+                    <a:p>
+                      <a:r>
+                        <a:rPr lang="en-US" sz="6000" dirty="0"/>
+                        <a:t>Decoy</a:t>
+                      </a:r>
+                    </a:p>
+                  </a:txBody>
+                  <a:tcPr/>
+                </a:tc>
+                <a:tc>
+                  <a:txBody>
+                    <a:bodyPr/>
+                    <a:lstStyle/>
+                    <a:p>
+                      <a:r>
+                        <a:rPr lang="en-US" sz="6000" dirty="0"/>
+                        <a:t>Total</a:t>
+                      </a:r>
+                    </a:p>
+                  </a:txBody>
+                  <a:tcPr/>
+                </a:tc>
+                <a:extLst>
+                  <a:ext uri="{0D108BD9-81ED-4DB2-BD59-A6C34878D82A}">
+                    <a16:rowId xmlns:a16="http://schemas.microsoft.com/office/drawing/2014/main" val="3923512006"/>
+                  </a:ext>
+                </a:extLst>
+              </a:tr>
+              <a:tr h="1468722">
+                <a:tc>
+                  <a:txBody>
+                    <a:bodyPr/>
+                    <a:lstStyle/>
+                    <a:p>
+                      <a:r>
+                        <a:rPr lang="en-US" sz="6000" dirty="0"/>
+                        <a:t>Split Window</a:t>
+                      </a:r>
+                    </a:p>
+                  </a:txBody>
+                  <a:tcPr/>
+                </a:tc>
+                <a:tc>
+                  <a:txBody>
+                    <a:bodyPr/>
+                    <a:lstStyle/>
+                    <a:p>
+                      <a:r>
+                        <a:rPr lang="en-US" sz="6000" dirty="0"/>
+                        <a:t>Work </a:t>
+                      </a:r>
+                    </a:p>
+                  </a:txBody>
+                  <a:tcPr/>
+                </a:tc>
+                <a:tc>
+                  <a:txBody>
+                    <a:bodyPr/>
+                    <a:lstStyle/>
+                    <a:p>
+                      <a:r>
+                        <a:rPr lang="en-US" sz="6000" dirty="0"/>
+                        <a:t>In</a:t>
+                      </a:r>
+                    </a:p>
+                  </a:txBody>
+                  <a:tcPr/>
+                </a:tc>
+                <a:tc>
+                  <a:txBody>
+                    <a:bodyPr/>
+                    <a:lstStyle/>
+                    <a:p>
+                      <a:r>
+                        <a:rPr lang="en-US" sz="6000" dirty="0"/>
+                        <a:t>Progress</a:t>
+                      </a:r>
+                    </a:p>
+                  </a:txBody>
+                  <a:tcPr/>
+                </a:tc>
+                <a:extLst>
+                  <a:ext uri="{0D108BD9-81ED-4DB2-BD59-A6C34878D82A}">
+                    <a16:rowId xmlns:a16="http://schemas.microsoft.com/office/drawing/2014/main" val="1523557545"/>
+                  </a:ext>
+                </a:extLst>
+              </a:tr>
+              <a:tr h="1468722">
+                <a:tc>
+                  <a:txBody>
+                    <a:bodyPr/>
+                    <a:lstStyle/>
+                    <a:p>
+                      <a:r>
+                        <a:rPr lang="en-US" sz="6000" dirty="0"/>
+                        <a:t>VGG-16</a:t>
+                      </a:r>
+                    </a:p>
+                  </a:txBody>
+                  <a:tcPr/>
+                </a:tc>
+                <a:tc>
+                  <a:txBody>
+                    <a:bodyPr/>
+                    <a:lstStyle/>
+                    <a:p>
+                      <a:endParaRPr lang="en-US" sz="6000"/>
+                    </a:p>
+                  </a:txBody>
+                  <a:tcPr/>
+                </a:tc>
+                <a:tc>
+                  <a:txBody>
+                    <a:bodyPr/>
+                    <a:lstStyle/>
+                    <a:p>
+                      <a:endParaRPr lang="en-US" sz="6000"/>
+                    </a:p>
+                  </a:txBody>
+                  <a:tcPr/>
+                </a:tc>
+                <a:tc>
+                  <a:txBody>
+                    <a:bodyPr/>
+                    <a:lstStyle/>
+                    <a:p>
+                      <a:endParaRPr lang="en-US" sz="6000" dirty="0"/>
+                    </a:p>
+                  </a:txBody>
+                  <a:tcPr/>
+                </a:tc>
+                <a:extLst>
+                  <a:ext uri="{0D108BD9-81ED-4DB2-BD59-A6C34878D82A}">
+                    <a16:rowId xmlns:a16="http://schemas.microsoft.com/office/drawing/2014/main" val="1047254246"/>
+                  </a:ext>
+                </a:extLst>
+              </a:tr>
+            </a:tbl>
+          </a:graphicData>
+        </a:graphic>
+      </p:graphicFrame>
+      <p:grpSp>
+        <p:nvGrpSpPr>
+          <p:cNvPr id="9" name="Group 8">
+            <a:extLst>
+              <a:ext uri="{FF2B5EF4-FFF2-40B4-BE49-F238E27FC236}">
+                <a16:creationId xmlns:a16="http://schemas.microsoft.com/office/drawing/2014/main" id="{7B8D8E58-D7D7-4148-AC79-89A5DF31624D}"/>
+              </a:ext>
+            </a:extLst>
+          </p:cNvPr>
+          <p:cNvGrpSpPr/>
+          <p:nvPr/>
+        </p:nvGrpSpPr>
+        <p:grpSpPr>
+          <a:xfrm>
+            <a:off x="12324117" y="22574660"/>
+            <a:ext cx="9144000" cy="6858000"/>
+            <a:chOff x="11887200" y="21475909"/>
+            <a:chExt cx="9144000" cy="6858000"/>
+          </a:xfrm>
+        </p:grpSpPr>
+        <p:pic>
+          <p:nvPicPr>
+            <p:cNvPr id="10" name="Picture 9">
+              <a:extLst>
+                <a:ext uri="{FF2B5EF4-FFF2-40B4-BE49-F238E27FC236}">
+                  <a16:creationId xmlns:a16="http://schemas.microsoft.com/office/drawing/2014/main" id="{8D536DBB-201B-2E48-B1E4-0E9BB50FDF32}"/>
+                </a:ext>
+              </a:extLst>
+            </p:cNvPr>
+            <p:cNvPicPr>
+              <a:picLocks noChangeAspect="1"/>
+            </p:cNvPicPr>
+            <p:nvPr/>
+          </p:nvPicPr>
+          <p:blipFill>
+            <a:blip r:embed="rId4"/>
+            <a:stretch>
+              <a:fillRect/>
+            </a:stretch>
+          </p:blipFill>
+          <p:spPr>
+            <a:xfrm>
+              <a:off x="11887200" y="21475909"/>
+              <a:ext cx="9144000" cy="6858000"/>
+            </a:xfrm>
+            <a:prstGeom prst="rect">
+              <a:avLst/>
+            </a:prstGeom>
+            <a:ln w="38100">
+              <a:solidFill>
+                <a:schemeClr val="accent1"/>
+              </a:solidFill>
+            </a:ln>
+          </p:spPr>
+        </p:pic>
+        <p:sp>
+          <p:nvSpPr>
+            <p:cNvPr id="12" name="TextBox 11">
+              <a:extLst>
+                <a:ext uri="{FF2B5EF4-FFF2-40B4-BE49-F238E27FC236}">
+                  <a16:creationId xmlns:a16="http://schemas.microsoft.com/office/drawing/2014/main" id="{8BCD52AA-C370-9A46-B16F-5428BC2294D0}"/>
+                </a:ext>
+              </a:extLst>
+            </p:cNvPr>
+            <p:cNvSpPr txBox="1"/>
+            <p:nvPr/>
+          </p:nvSpPr>
+          <p:spPr>
+            <a:xfrm>
+              <a:off x="15618455" y="25962531"/>
+              <a:ext cx="1292866" cy="461665"/>
+            </a:xfrm>
+            <a:prstGeom prst="rect">
+              <a:avLst/>
+            </a:prstGeom>
+            <a:noFill/>
+            <a:ln w="38100">
+              <a:solidFill>
+                <a:schemeClr val="accent1"/>
+              </a:solidFill>
+            </a:ln>
+          </p:spPr>
+          <p:txBody>
+            <a:bodyPr wrap="square" rtlCol="0">
+              <a:spAutoFit/>
+            </a:bodyPr>
+            <a:lstStyle/>
+            <a:p>
+              <a:r>
+                <a:rPr lang="en-US" sz="2400" b="1" dirty="0"/>
+                <a:t>Target</a:t>
+              </a:r>
+            </a:p>
+          </p:txBody>
+        </p:sp>
+        <p:cxnSp>
+          <p:nvCxnSpPr>
+            <p:cNvPr id="13" name="Straight Arrow Connector 12">
+              <a:extLst>
+                <a:ext uri="{FF2B5EF4-FFF2-40B4-BE49-F238E27FC236}">
+                  <a16:creationId xmlns:a16="http://schemas.microsoft.com/office/drawing/2014/main" id="{C88CD9CE-3305-7141-A1D9-F5B6E9768D96}"/>
+                </a:ext>
+              </a:extLst>
+            </p:cNvPr>
+            <p:cNvCxnSpPr>
+              <a:cxnSpLocks/>
+            </p:cNvCxnSpPr>
+            <p:nvPr/>
+          </p:nvCxnSpPr>
+          <p:spPr>
+            <a:xfrm flipH="1" flipV="1">
+              <a:off x="15186656" y="25229482"/>
+              <a:ext cx="431799" cy="486330"/>
+            </a:xfrm>
+            <a:prstGeom prst="straightConnector1">
+              <a:avLst/>
+            </a:prstGeom>
+            <a:ln w="38100">
+              <a:solidFill>
+                <a:schemeClr val="accent1"/>
+              </a:solidFill>
+              <a:tailEnd type="triangle"/>
+            </a:ln>
+          </p:spPr>
+          <p:style>
+            <a:lnRef idx="1">
+              <a:schemeClr val="accent1"/>
+            </a:lnRef>
+            <a:fillRef idx="0">
+              <a:schemeClr val="accent1"/>
+            </a:fillRef>
+            <a:effectRef idx="0">
+              <a:schemeClr val="accent1"/>
+            </a:effectRef>
+            <a:fontRef idx="minor">
+              <a:schemeClr val="tx1"/>
+            </a:fontRef>
+          </p:style>
+        </p:cxnSp>
+        <p:sp>
+          <p:nvSpPr>
+            <p:cNvPr id="23" name="TextBox 22">
+              <a:extLst>
+                <a:ext uri="{FF2B5EF4-FFF2-40B4-BE49-F238E27FC236}">
+                  <a16:creationId xmlns:a16="http://schemas.microsoft.com/office/drawing/2014/main" id="{0ADD9D1D-85C7-2D4A-AC5C-4C0074D0124D}"/>
+                </a:ext>
+              </a:extLst>
+            </p:cNvPr>
+            <p:cNvSpPr txBox="1"/>
+            <p:nvPr/>
+          </p:nvSpPr>
+          <p:spPr>
+            <a:xfrm>
+              <a:off x="14505932" y="23291389"/>
+              <a:ext cx="1292867" cy="461665"/>
+            </a:xfrm>
+            <a:prstGeom prst="rect">
+              <a:avLst/>
+            </a:prstGeom>
+            <a:noFill/>
+            <a:ln w="38100">
+              <a:solidFill>
+                <a:schemeClr val="accent1"/>
+              </a:solidFill>
+            </a:ln>
+          </p:spPr>
+          <p:txBody>
+            <a:bodyPr wrap="square" rtlCol="0">
+              <a:spAutoFit/>
+            </a:bodyPr>
+            <a:lstStyle/>
+            <a:p>
+              <a:r>
+                <a:rPr lang="en-US" sz="2400" b="1" dirty="0"/>
+                <a:t>Surface</a:t>
+              </a:r>
+            </a:p>
+          </p:txBody>
+        </p:sp>
+        <p:cxnSp>
+          <p:nvCxnSpPr>
+            <p:cNvPr id="24" name="Straight Arrow Connector 23">
+              <a:extLst>
+                <a:ext uri="{FF2B5EF4-FFF2-40B4-BE49-F238E27FC236}">
+                  <a16:creationId xmlns:a16="http://schemas.microsoft.com/office/drawing/2014/main" id="{CEEA0544-98EA-DA4C-8638-855EF8183540}"/>
+                </a:ext>
+              </a:extLst>
+            </p:cNvPr>
+            <p:cNvCxnSpPr>
+              <a:cxnSpLocks/>
+            </p:cNvCxnSpPr>
+            <p:nvPr/>
+          </p:nvCxnSpPr>
+          <p:spPr>
+            <a:xfrm flipH="1">
+              <a:off x="13936509" y="23660721"/>
+              <a:ext cx="528322" cy="729734"/>
+            </a:xfrm>
+            <a:prstGeom prst="straightConnector1">
+              <a:avLst/>
+            </a:prstGeom>
+            <a:ln w="38100">
+              <a:solidFill>
+                <a:schemeClr val="accent1"/>
+              </a:solidFill>
+              <a:tailEnd type="triangle"/>
+            </a:ln>
+          </p:spPr>
+          <p:style>
+            <a:lnRef idx="1">
+              <a:schemeClr val="accent1"/>
+            </a:lnRef>
+            <a:fillRef idx="0">
+              <a:schemeClr val="accent1"/>
+            </a:fillRef>
+            <a:effectRef idx="0">
+              <a:schemeClr val="accent1"/>
+            </a:effectRef>
+            <a:fontRef idx="minor">
+              <a:schemeClr val="tx1"/>
+            </a:fontRef>
+          </p:style>
+        </p:cxnSp>
+        <p:sp>
+          <p:nvSpPr>
+            <p:cNvPr id="42" name="TextBox 41">
+              <a:extLst>
+                <a:ext uri="{FF2B5EF4-FFF2-40B4-BE49-F238E27FC236}">
+                  <a16:creationId xmlns:a16="http://schemas.microsoft.com/office/drawing/2014/main" id="{FA55EE27-CA13-B544-8999-C3DC8F146D1B}"/>
+                </a:ext>
+              </a:extLst>
+            </p:cNvPr>
+            <p:cNvSpPr txBox="1"/>
+            <p:nvPr/>
+          </p:nvSpPr>
+          <p:spPr>
+            <a:xfrm>
+              <a:off x="16404677" y="23087690"/>
+              <a:ext cx="1292867" cy="461665"/>
+            </a:xfrm>
+            <a:prstGeom prst="rect">
+              <a:avLst/>
+            </a:prstGeom>
+            <a:noFill/>
+            <a:ln w="38100">
+              <a:solidFill>
+                <a:schemeClr val="accent1"/>
+              </a:solidFill>
+            </a:ln>
+          </p:spPr>
+          <p:txBody>
+            <a:bodyPr wrap="square" rtlCol="0">
+              <a:spAutoFit/>
+            </a:bodyPr>
+            <a:lstStyle/>
+            <a:p>
+              <a:r>
+                <a:rPr lang="en-US" sz="2400" b="1" dirty="0"/>
+                <a:t>Bottom</a:t>
+              </a:r>
+            </a:p>
+          </p:txBody>
+        </p:sp>
+        <p:cxnSp>
+          <p:nvCxnSpPr>
+            <p:cNvPr id="44" name="Straight Arrow Connector 43">
+              <a:extLst>
+                <a:ext uri="{FF2B5EF4-FFF2-40B4-BE49-F238E27FC236}">
+                  <a16:creationId xmlns:a16="http://schemas.microsoft.com/office/drawing/2014/main" id="{7B3FC26F-CCA3-4D46-989D-B98CA3D301B0}"/>
+                </a:ext>
+              </a:extLst>
+            </p:cNvPr>
+            <p:cNvCxnSpPr>
+              <a:cxnSpLocks/>
+            </p:cNvCxnSpPr>
+            <p:nvPr/>
+          </p:nvCxnSpPr>
+          <p:spPr>
+            <a:xfrm flipH="1">
+              <a:off x="15835254" y="23457022"/>
+              <a:ext cx="528322" cy="729734"/>
+            </a:xfrm>
+            <a:prstGeom prst="straightConnector1">
+              <a:avLst/>
+            </a:prstGeom>
+            <a:ln w="38100">
+              <a:solidFill>
+                <a:schemeClr val="accent1"/>
+              </a:solidFill>
+              <a:tailEnd type="triangle"/>
+            </a:ln>
+          </p:spPr>
+          <p:style>
+            <a:lnRef idx="1">
+              <a:schemeClr val="accent1"/>
+            </a:lnRef>
+            <a:fillRef idx="0">
+              <a:schemeClr val="accent1"/>
+            </a:fillRef>
+            <a:effectRef idx="0">
+              <a:schemeClr val="accent1"/>
+            </a:effectRef>
+            <a:fontRef idx="minor">
+              <a:schemeClr val="tx1"/>
+            </a:fontRef>
+          </p:style>
+        </p:cxnSp>
+      </p:grpSp>
+      <p:sp>
+        <p:nvSpPr>
+          <p:cNvPr id="11" name="Rectangle 10">
+            <a:extLst>
+              <a:ext uri="{FF2B5EF4-FFF2-40B4-BE49-F238E27FC236}">
+                <a16:creationId xmlns:a16="http://schemas.microsoft.com/office/drawing/2014/main" id="{4B27CD71-2073-0C46-A6A6-5B21B787BC28}"/>
+              </a:ext>
+            </a:extLst>
+          </p:cNvPr>
+          <p:cNvSpPr/>
+          <p:nvPr/>
+        </p:nvSpPr>
+        <p:spPr>
+          <a:xfrm>
+            <a:off x="21858516" y="3840480"/>
+            <a:ext cx="9144000" cy="14269734"/>
+          </a:xfrm>
+          <a:prstGeom prst="rect">
+            <a:avLst/>
+          </a:prstGeom>
+          <a:noFill/>
+          <a:ln w="38100"/>
+        </p:spPr>
+        <p:style>
+          <a:lnRef idx="2">
+            <a:schemeClr val="accent1">
+              <a:shade val="50000"/>
+            </a:schemeClr>
+          </a:lnRef>
+          <a:fillRef idx="1">
+            <a:schemeClr val="accent1"/>
+          </a:fillRef>
+          <a:effectRef idx="0">
+            <a:schemeClr val="accent1"/>
+          </a:effectRef>
+          <a:fontRef idx="minor">
+            <a:schemeClr val="lt1"/>
+          </a:fontRef>
+        </p:style>
+        <p:txBody>
+          <a:bodyPr rtlCol="0" anchor="ctr"/>
+          <a:lstStyle/>
+          <a:p>
+            <a:pPr algn="ctr"/>
+            <a:endParaRPr lang="en-US"/>
+          </a:p>
+        </p:txBody>
+      </p:sp>
     </p:spTree>
     <p:extLst>
       <p:ext uri="{BB962C8B-B14F-4D97-AF65-F5344CB8AC3E}">

</xml_diff>

<commit_message>
Added .png to the gitignore in Documents directory
</commit_message>
<xml_diff>
--- a/Documents/Poster.pptx
+++ b/Documents/Poster.pptx
@@ -243,7 +243,7 @@
           <a:p>
             <a:fld id="{8F5E9548-19BC-454A-9349-354AE2A93C1E}" type="datetimeFigureOut">
               <a:rPr lang="en-US" smtClean="0"/>
-              <a:t>4/30/19</a:t>
+              <a:t>5/6/19</a:t>
             </a:fld>
             <a:endParaRPr lang="en-US"/>
           </a:p>
@@ -413,7 +413,7 @@
           <a:p>
             <a:fld id="{8F5E9548-19BC-454A-9349-354AE2A93C1E}" type="datetimeFigureOut">
               <a:rPr lang="en-US" smtClean="0"/>
-              <a:t>4/30/19</a:t>
+              <a:t>5/6/19</a:t>
             </a:fld>
             <a:endParaRPr lang="en-US"/>
           </a:p>
@@ -593,7 +593,7 @@
           <a:p>
             <a:fld id="{8F5E9548-19BC-454A-9349-354AE2A93C1E}" type="datetimeFigureOut">
               <a:rPr lang="en-US" smtClean="0"/>
-              <a:t>4/30/19</a:t>
+              <a:t>5/6/19</a:t>
             </a:fld>
             <a:endParaRPr lang="en-US"/>
           </a:p>
@@ -763,7 +763,7 @@
           <a:p>
             <a:fld id="{8F5E9548-19BC-454A-9349-354AE2A93C1E}" type="datetimeFigureOut">
               <a:rPr lang="en-US" smtClean="0"/>
-              <a:t>4/30/19</a:t>
+              <a:t>5/6/19</a:t>
             </a:fld>
             <a:endParaRPr lang="en-US"/>
           </a:p>
@@ -1007,7 +1007,7 @@
           <a:p>
             <a:fld id="{8F5E9548-19BC-454A-9349-354AE2A93C1E}" type="datetimeFigureOut">
               <a:rPr lang="en-US" smtClean="0"/>
-              <a:t>4/30/19</a:t>
+              <a:t>5/6/19</a:t>
             </a:fld>
             <a:endParaRPr lang="en-US"/>
           </a:p>
@@ -1239,7 +1239,7 @@
           <a:p>
             <a:fld id="{8F5E9548-19BC-454A-9349-354AE2A93C1E}" type="datetimeFigureOut">
               <a:rPr lang="en-US" smtClean="0"/>
-              <a:t>4/30/19</a:t>
+              <a:t>5/6/19</a:t>
             </a:fld>
             <a:endParaRPr lang="en-US"/>
           </a:p>
@@ -1606,7 +1606,7 @@
           <a:p>
             <a:fld id="{8F5E9548-19BC-454A-9349-354AE2A93C1E}" type="datetimeFigureOut">
               <a:rPr lang="en-US" smtClean="0"/>
-              <a:t>4/30/19</a:t>
+              <a:t>5/6/19</a:t>
             </a:fld>
             <a:endParaRPr lang="en-US"/>
           </a:p>
@@ -1724,7 +1724,7 @@
           <a:p>
             <a:fld id="{8F5E9548-19BC-454A-9349-354AE2A93C1E}" type="datetimeFigureOut">
               <a:rPr lang="en-US" smtClean="0"/>
-              <a:t>4/30/19</a:t>
+              <a:t>5/6/19</a:t>
             </a:fld>
             <a:endParaRPr lang="en-US"/>
           </a:p>
@@ -1819,7 +1819,7 @@
           <a:p>
             <a:fld id="{8F5E9548-19BC-454A-9349-354AE2A93C1E}" type="datetimeFigureOut">
               <a:rPr lang="en-US" smtClean="0"/>
-              <a:t>4/30/19</a:t>
+              <a:t>5/6/19</a:t>
             </a:fld>
             <a:endParaRPr lang="en-US"/>
           </a:p>
@@ -2096,7 +2096,7 @@
           <a:p>
             <a:fld id="{8F5E9548-19BC-454A-9349-354AE2A93C1E}" type="datetimeFigureOut">
               <a:rPr lang="en-US" smtClean="0"/>
-              <a:t>4/30/19</a:t>
+              <a:t>5/6/19</a:t>
             </a:fld>
             <a:endParaRPr lang="en-US"/>
           </a:p>
@@ -2353,7 +2353,7 @@
           <a:p>
             <a:fld id="{8F5E9548-19BC-454A-9349-354AE2A93C1E}" type="datetimeFigureOut">
               <a:rPr lang="en-US" smtClean="0"/>
-              <a:t>4/30/19</a:t>
+              <a:t>5/6/19</a:t>
             </a:fld>
             <a:endParaRPr lang="en-US"/>
           </a:p>
@@ -2566,7 +2566,7 @@
           <a:p>
             <a:fld id="{8F5E9548-19BC-454A-9349-354AE2A93C1E}" type="datetimeFigureOut">
               <a:rPr lang="en-US" smtClean="0"/>
-              <a:t>4/30/19</a:t>
+              <a:t>5/6/19</a:t>
             </a:fld>
             <a:endParaRPr lang="en-US"/>
           </a:p>
@@ -2993,7 +2993,7 @@
         </p:blipFill>
         <p:spPr>
           <a:xfrm>
-            <a:off x="12238504" y="15283375"/>
+            <a:off x="12369132" y="15283375"/>
             <a:ext cx="9144000" cy="6858000"/>
           </a:xfrm>
           <a:prstGeom prst="rect">
@@ -3001,7 +3001,7 @@
           </a:prstGeom>
           <a:ln w="38100">
             <a:solidFill>
-              <a:schemeClr val="tx1"/>
+              <a:schemeClr val="accent1"/>
             </a:solidFill>
           </a:ln>
         </p:spPr>
@@ -3024,8 +3024,8 @@
         </p:nvSpPr>
         <p:spPr>
           <a:xfrm>
-            <a:off x="2942104" y="1177827"/>
-            <a:ext cx="22071012" cy="2308324"/>
+            <a:off x="2855018" y="1177827"/>
+            <a:ext cx="22158098" cy="2308324"/>
           </a:xfrm>
           <a:solidFill>
             <a:schemeClr val="accent6">
@@ -3062,8 +3062,8 @@
         </p:nvSpPr>
         <p:spPr>
           <a:xfrm>
-            <a:off x="24953118" y="1177826"/>
-            <a:ext cx="15851981" cy="2308324"/>
+            <a:off x="24953119" y="1177826"/>
+            <a:ext cx="15644392" cy="2308324"/>
           </a:xfrm>
           <a:prstGeom prst="rect">
             <a:avLst/>
@@ -3120,7 +3120,7 @@
         </p:nvSpPr>
         <p:spPr>
           <a:xfrm>
-            <a:off x="2835779" y="3840480"/>
+            <a:off x="2855018" y="3840479"/>
             <a:ext cx="9144000" cy="7725192"/>
           </a:xfrm>
           <a:prstGeom prst="rect">
@@ -3183,8 +3183,8 @@
         </p:nvSpPr>
         <p:spPr>
           <a:xfrm>
-            <a:off x="12238504" y="3840480"/>
-            <a:ext cx="9144000" cy="11110734"/>
+            <a:off x="12369132" y="3840480"/>
+            <a:ext cx="9144000" cy="11049179"/>
           </a:xfrm>
           <a:prstGeom prst="rect">
             <a:avLst/>
@@ -3192,7 +3192,7 @@
           <a:noFill/>
           <a:ln w="38100">
             <a:solidFill>
-              <a:schemeClr val="tx1"/>
+              <a:schemeClr val="accent1"/>
             </a:solidFill>
           </a:ln>
         </p:spPr>
@@ -3225,7 +3225,7 @@
             </a:pPr>
             <a:r>
               <a:rPr lang="en-US" sz="4400" dirty="0"/>
-              <a:t>Two “VGG style” convolutional ”pre-processing” layers</a:t>
+              <a:t>Two convolutional ”pre-processing” layers</a:t>
             </a:r>
           </a:p>
           <a:p>
@@ -3249,6 +3249,16 @@
             </a:r>
           </a:p>
           <a:p>
+            <a:pPr marL="685800" indent="-685800">
+              <a:buFont typeface="Arial" panose="020B0604020202020204" pitchFamily="34" charset="0"/>
+              <a:buChar char="•"/>
+            </a:pPr>
+            <a:r>
+              <a:rPr lang="en-US" sz="4400" dirty="0"/>
+              <a:t>A Sigmoid activation after the 2nd FC</a:t>
+            </a:r>
+          </a:p>
+          <a:p>
             <a:endParaRPr lang="en-US" sz="4400" dirty="0"/>
           </a:p>
           <a:p>
@@ -3262,11 +3272,8 @@
             </a:r>
             <a:r>
               <a:rPr lang="en-US" sz="4400" dirty="0"/>
-              <a:t> because there can be targets in multiple bins. Training was with SGD</a:t>
-            </a:r>
-          </a:p>
-          <a:p>
-            <a:endParaRPr lang="en-US" sz="4800" dirty="0"/>
+              <a:t> because there can be targets in multiple bins. </a:t>
+            </a:r>
           </a:p>
         </p:txBody>
       </p:sp>
@@ -3284,8 +3291,8 @@
         </p:nvSpPr>
         <p:spPr>
           <a:xfrm>
-            <a:off x="21306304" y="4364532"/>
-            <a:ext cx="8945096" cy="830997"/>
+            <a:off x="21969388" y="4309193"/>
+            <a:ext cx="9144000" cy="830997"/>
           </a:xfrm>
           <a:prstGeom prst="rect">
             <a:avLst/>
@@ -3320,8 +3327,8 @@
         </p:nvSpPr>
         <p:spPr>
           <a:xfrm>
-            <a:off x="31549763" y="3842016"/>
-            <a:ext cx="9144000" cy="9017853"/>
+            <a:off x="31438573" y="3840479"/>
+            <a:ext cx="9144000" cy="8947139"/>
           </a:xfrm>
           <a:prstGeom prst="rect">
             <a:avLst/>
@@ -3335,7 +3342,7 @@
         </p:spPr>
         <p:txBody>
           <a:bodyPr wrap="square" rtlCol="0">
-            <a:spAutoFit/>
+            <a:normAutofit fontScale="92500"/>
           </a:bodyPr>
           <a:lstStyle/>
           <a:p>
@@ -3352,25 +3359,25 @@
           <a:p>
             <a:r>
               <a:rPr lang="en-US" sz="4400" dirty="0"/>
-              <a:t>25,000 total samples</a:t>
+              <a:t>40,000 total samples</a:t>
             </a:r>
           </a:p>
           <a:p>
             <a:r>
               <a:rPr lang="en-US" sz="4400" dirty="0"/>
-              <a:t>	15,000 training</a:t>
+              <a:t>	20,000 training</a:t>
             </a:r>
           </a:p>
           <a:p>
             <a:r>
               <a:rPr lang="en-US" sz="4400" dirty="0"/>
-              <a:t>	5,000 validation</a:t>
+              <a:t>	10,000 validation</a:t>
             </a:r>
           </a:p>
           <a:p>
             <a:r>
               <a:rPr lang="en-US" sz="4400" dirty="0"/>
-              <a:t>	5,000 test</a:t>
+              <a:t>	10,000 test</a:t>
             </a:r>
           </a:p>
           <a:p>
@@ -3399,7 +3406,7 @@
             </a:pPr>
             <a:r>
               <a:rPr lang="en-US" sz="4400" dirty="0"/>
-              <a:t>Decoy presence, location, doppler</a:t>
+              <a:t>Water depth, wind speed, bottom type, volume scattering</a:t>
             </a:r>
           </a:p>
           <a:p>
@@ -3407,9 +3414,21 @@
               <a:buFont typeface="Arial" panose="020B0604020202020204" pitchFamily="34" charset="0"/>
               <a:buChar char="•"/>
             </a:pPr>
+            <a:endParaRPr lang="en-US" sz="4400" dirty="0"/>
+          </a:p>
+          <a:p>
+            <a:pPr algn="ctr"/>
             <a:r>
               <a:rPr lang="en-US" sz="4400" dirty="0"/>
-              <a:t>Water depth, wind speed, bottom type, volume scattering</a:t>
+              <a:t>SGD </a:t>
+            </a:r>
+            <a:r>
+              <a:rPr lang="en-US" sz="4400" dirty="0" err="1"/>
+              <a:t>Optimilzer</a:t>
+            </a:r>
+            <a:r>
+              <a:rPr lang="en-US" sz="4400" dirty="0"/>
+              <a:t> with variable learning rate (1e-2, 1e-4, 1e-6) and mini-batch size 20</a:t>
             </a:r>
           </a:p>
           <a:p>
@@ -3432,7 +3451,7 @@
         <p:spPr>
           <a:xfrm>
             <a:off x="2855535" y="11698689"/>
-            <a:ext cx="9144000" cy="17820263"/>
+            <a:ext cx="9144000" cy="17855628"/>
           </a:xfrm>
           <a:prstGeom prst="rect">
             <a:avLst/>
@@ -3440,13 +3459,13 @@
           <a:noFill/>
           <a:ln w="38100">
             <a:solidFill>
-              <a:schemeClr val="tx1"/>
+              <a:schemeClr val="accent1"/>
             </a:solidFill>
           </a:ln>
         </p:spPr>
         <p:txBody>
-          <a:bodyPr wrap="square" rtlCol="0">
-            <a:spAutoFit/>
+          <a:bodyPr wrap="square" rtlCol="0" anchor="ctr" anchorCtr="0">
+            <a:normAutofit lnSpcReduction="10000"/>
           </a:bodyPr>
           <a:lstStyle/>
           <a:p>
@@ -3463,7 +3482,7 @@
           <a:p>
             <a:r>
               <a:rPr lang="en-US" sz="4400" dirty="0"/>
-              <a:t>In this case, we are hypothesizing a torpedo sonar. Relevant details are:</a:t>
+              <a:t>In this case, we are hypothesizing a torpedo sonar. It’s job is to identify the range and Doppler (frame and bin) of a target if there is one. Relevant details are:</a:t>
             </a:r>
           </a:p>
           <a:p>
@@ -3476,17 +3495,7 @@
             </a:pPr>
             <a:r>
               <a:rPr lang="en-US" sz="4400" dirty="0"/>
-              <a:t>The target has structure and is moving</a:t>
-            </a:r>
-          </a:p>
-          <a:p>
-            <a:pPr marL="685800" indent="-685800">
-              <a:buFont typeface="Arial" panose="020B0604020202020204" pitchFamily="34" charset="0"/>
-              <a:buChar char="•"/>
-            </a:pPr>
-            <a:r>
-              <a:rPr lang="en-US" sz="4400" dirty="0"/>
-              <a:t>There can be decoys (echo repeaters)</a:t>
+              <a:t>The target has structure modelled as highlights) and is moving</a:t>
             </a:r>
           </a:p>
           <a:p>
@@ -3543,7 +3552,7 @@
           <a:p>
             <a:r>
               <a:rPr lang="en-US" sz="4400" dirty="0"/>
-              <a:t>A simulation was used to generate training, validation, and test data with random</a:t>
+              <a:t>A MATLAB simulation was used to generate training, validation, and test data with random</a:t>
             </a:r>
             <a:br>
               <a:rPr lang="en-US" sz="4400" dirty="0"/>
@@ -3567,17 +3576,24 @@
             </a:pPr>
             <a:r>
               <a:rPr lang="en-US" sz="4400" dirty="0"/>
-              <a:t>Decoy presence, location, doppler</a:t>
-            </a:r>
-          </a:p>
-          <a:p>
-            <a:pPr marL="685800" indent="-685800">
-              <a:buFont typeface="Arial" panose="020B0604020202020204" pitchFamily="34" charset="0"/>
-              <a:buChar char="•"/>
-            </a:pPr>
-            <a:r>
-              <a:rPr lang="en-US" sz="4400" dirty="0"/>
               <a:t>Water depth, wind speed, bottom type, volume scattering</a:t>
+            </a:r>
+          </a:p>
+          <a:p>
+            <a:endParaRPr lang="en-US" sz="4400" dirty="0"/>
+          </a:p>
+          <a:p>
+            <a:pPr algn="ctr"/>
+            <a:r>
+              <a:rPr lang="en-US" sz="4400" u="sng" dirty="0"/>
+              <a:t>X: 25 beams x 64 frames x 64 bins</a:t>
+            </a:r>
+          </a:p>
+          <a:p>
+            <a:pPr algn="ctr"/>
+            <a:r>
+              <a:rPr lang="en-US" sz="4400" u="sng" dirty="0"/>
+              <a:t>Y: 64+64 frame/bin detection state</a:t>
             </a:r>
           </a:p>
         </p:txBody>
@@ -3596,8 +3612,8 @@
         </p:nvSpPr>
         <p:spPr>
           <a:xfrm>
-            <a:off x="23414410" y="6202060"/>
-            <a:ext cx="4598895" cy="886701"/>
+            <a:off x="24053038" y="6202059"/>
+            <a:ext cx="4572000" cy="914400"/>
           </a:xfrm>
           <a:prstGeom prst="rect">
             <a:avLst/>
@@ -3626,7 +3642,7 @@
             <a:pPr algn="ctr"/>
             <a:r>
               <a:rPr lang="en-US" dirty="0"/>
-              <a:t>CONV: 25x11x11-&gt;25</a:t>
+              <a:t>CONV: 25x7x7-&gt;25</a:t>
             </a:r>
           </a:p>
         </p:txBody>
@@ -3645,8 +3661,8 @@
         </p:nvSpPr>
         <p:spPr>
           <a:xfrm>
-            <a:off x="23414409" y="7996923"/>
-            <a:ext cx="4598895" cy="886701"/>
+            <a:off x="24053037" y="7996922"/>
+            <a:ext cx="4572000" cy="914400"/>
           </a:xfrm>
           <a:prstGeom prst="rect">
             <a:avLst/>
@@ -3708,8 +3724,8 @@
         </p:nvSpPr>
         <p:spPr>
           <a:xfrm>
-            <a:off x="23403204" y="12263584"/>
-            <a:ext cx="2350157" cy="886701"/>
+            <a:off x="24041830" y="12229390"/>
+            <a:ext cx="2286000" cy="914400"/>
           </a:xfrm>
           <a:prstGeom prst="rect">
             <a:avLst/>
@@ -3738,7 +3754,7 @@
             <a:pPr algn="ctr"/>
             <a:r>
               <a:rPr lang="en-US" dirty="0"/>
-              <a:t>CONV: 11x11x25-&gt;128</a:t>
+              <a:t>CONV: 11x11x25-&gt;64</a:t>
             </a:r>
           </a:p>
         </p:txBody>
@@ -3757,8 +3773,8 @@
         </p:nvSpPr>
         <p:spPr>
           <a:xfrm>
-            <a:off x="25753361" y="12270189"/>
-            <a:ext cx="2339513" cy="877779"/>
+            <a:off x="26340308" y="12221117"/>
+            <a:ext cx="2286000" cy="914400"/>
           </a:xfrm>
           <a:prstGeom prst="rect">
             <a:avLst/>
@@ -3787,7 +3803,7 @@
             <a:pPr algn="ctr"/>
             <a:r>
               <a:rPr lang="en-US" dirty="0"/>
-              <a:t>CONV: 11x11x25-&gt;256</a:t>
+              <a:t>CONV: 11x11x25-&gt;64</a:t>
             </a:r>
           </a:p>
         </p:txBody>
@@ -3806,8 +3822,8 @@
         </p:nvSpPr>
         <p:spPr>
           <a:xfrm>
-            <a:off x="23414408" y="7088761"/>
-            <a:ext cx="4598895" cy="886701"/>
+            <a:off x="24053036" y="7088760"/>
+            <a:ext cx="4572000" cy="914400"/>
           </a:xfrm>
           <a:prstGeom prst="rect">
             <a:avLst/>
@@ -3862,8 +3878,8 @@
         </p:nvSpPr>
         <p:spPr>
           <a:xfrm>
-            <a:off x="23403204" y="9157527"/>
-            <a:ext cx="4598895" cy="886701"/>
+            <a:off x="24041832" y="9157526"/>
+            <a:ext cx="4572000" cy="914400"/>
           </a:xfrm>
           <a:prstGeom prst="rect">
             <a:avLst/>
@@ -3892,7 +3908,7 @@
             <a:pPr algn="ctr"/>
             <a:r>
               <a:rPr lang="en-US" dirty="0"/>
-              <a:t>CONV: 25x19x19-&gt;25</a:t>
+              <a:t>CONV: 25x11x11-&gt;25</a:t>
             </a:r>
           </a:p>
         </p:txBody>
@@ -3911,8 +3927,8 @@
         </p:nvSpPr>
         <p:spPr>
           <a:xfrm>
-            <a:off x="23403203" y="10952390"/>
-            <a:ext cx="4598895" cy="886701"/>
+            <a:off x="24041831" y="10952389"/>
+            <a:ext cx="4572000" cy="914400"/>
           </a:xfrm>
           <a:prstGeom prst="rect">
             <a:avLst/>
@@ -3974,8 +3990,8 @@
         </p:nvSpPr>
         <p:spPr>
           <a:xfrm>
-            <a:off x="23403202" y="10044228"/>
-            <a:ext cx="4598895" cy="886701"/>
+            <a:off x="24041830" y="10044227"/>
+            <a:ext cx="4572000" cy="914400"/>
           </a:xfrm>
           <a:prstGeom prst="rect">
             <a:avLst/>
@@ -4030,8 +4046,8 @@
         </p:nvSpPr>
         <p:spPr>
           <a:xfrm>
-            <a:off x="23403202" y="14054155"/>
-            <a:ext cx="2350157" cy="886701"/>
+            <a:off x="24061586" y="14026476"/>
+            <a:ext cx="2286000" cy="914400"/>
           </a:xfrm>
           <a:prstGeom prst="rect">
             <a:avLst/>
@@ -4074,7 +4090,7 @@
             </a:r>
             <a:r>
               <a:rPr lang="en-US" dirty="0"/>
-              <a:t>: 128</a:t>
+              <a:t>: 64</a:t>
             </a:r>
           </a:p>
         </p:txBody>
@@ -4093,8 +4109,8 @@
         </p:nvSpPr>
         <p:spPr>
           <a:xfrm>
-            <a:off x="25742717" y="14056130"/>
-            <a:ext cx="2350157" cy="862923"/>
+            <a:off x="26339036" y="14015980"/>
+            <a:ext cx="2286000" cy="914400"/>
           </a:xfrm>
           <a:prstGeom prst="rect">
             <a:avLst/>
@@ -4137,7 +4153,7 @@
             </a:r>
             <a:r>
               <a:rPr lang="en-US" dirty="0"/>
-              <a:t>: 256</a:t>
+              <a:t>: 64</a:t>
             </a:r>
           </a:p>
         </p:txBody>
@@ -4156,8 +4172,8 @@
         </p:nvSpPr>
         <p:spPr>
           <a:xfrm>
-            <a:off x="23392560" y="13147968"/>
-            <a:ext cx="2350157" cy="886701"/>
+            <a:off x="24061586" y="13116092"/>
+            <a:ext cx="2286000" cy="914400"/>
           </a:xfrm>
           <a:prstGeom prst="rect">
             <a:avLst/>
@@ -4212,8 +4228,8 @@
         </p:nvSpPr>
         <p:spPr>
           <a:xfrm>
-            <a:off x="25753359" y="13156890"/>
-            <a:ext cx="2350157" cy="886701"/>
+            <a:off x="26340308" y="13117422"/>
+            <a:ext cx="2286000" cy="914400"/>
           </a:xfrm>
           <a:prstGeom prst="rect">
             <a:avLst/>
@@ -4268,8 +4284,8 @@
         </p:nvSpPr>
         <p:spPr>
           <a:xfrm>
-            <a:off x="23414407" y="15251919"/>
-            <a:ext cx="4689109" cy="886701"/>
+            <a:off x="24053035" y="15251918"/>
+            <a:ext cx="4572000" cy="914400"/>
           </a:xfrm>
           <a:prstGeom prst="rect">
             <a:avLst/>
@@ -4308,7 +4324,7 @@
             <a:pPr algn="ctr"/>
             <a:r>
               <a:rPr lang="en-US" dirty="0"/>
-              <a:t>FC: 384</a:t>
+              <a:t>FC: 128</a:t>
             </a:r>
           </a:p>
         </p:txBody>
@@ -4327,8 +4343,8 @@
         </p:nvSpPr>
         <p:spPr>
           <a:xfrm>
-            <a:off x="23414407" y="16146557"/>
-            <a:ext cx="4689109" cy="886701"/>
+            <a:off x="24047230" y="17071235"/>
+            <a:ext cx="4572000" cy="914400"/>
           </a:xfrm>
           <a:prstGeom prst="rect">
             <a:avLst/>
@@ -4367,48 +4383,11 @@
             <a:pPr algn="ctr"/>
             <a:r>
               <a:rPr lang="en-US" dirty="0"/>
-              <a:t>FC: 384</a:t>
-            </a:r>
-          </a:p>
-        </p:txBody>
-      </p:sp>
-      <p:pic>
-        <p:nvPicPr>
-          <p:cNvPr id="43" name="Picture 42" descr="A close up of a map&#10;&#10;Description automatically generated">
-            <a:extLst>
-              <a:ext uri="{FF2B5EF4-FFF2-40B4-BE49-F238E27FC236}">
-                <a16:creationId xmlns:a16="http://schemas.microsoft.com/office/drawing/2014/main" id="{3F144504-CB89-544E-8A08-1D65D3FC62C1}"/>
-              </a:ext>
-            </a:extLst>
-          </p:cNvPr>
-          <p:cNvPicPr>
-            <a:picLocks noChangeAspect="1"/>
-          </p:cNvPicPr>
-          <p:nvPr/>
-        </p:nvPicPr>
-        <p:blipFill>
-          <a:blip r:embed="rId3"/>
-          <a:stretch>
-            <a:fillRect/>
-          </a:stretch>
-        </p:blipFill>
-        <p:spPr>
-          <a:xfrm>
-            <a:off x="31549763" y="16198420"/>
-            <a:ext cx="9144000" cy="6858000"/>
-          </a:xfrm>
-          <a:prstGeom prst="rect">
-            <a:avLst/>
-          </a:prstGeom>
-          <a:ln w="38100">
-            <a:solidFill>
-              <a:schemeClr val="accent1">
-                <a:shade val="50000"/>
-              </a:schemeClr>
-            </a:solidFill>
-          </a:ln>
-        </p:spPr>
-      </p:pic>
+              <a:t>FC: 128</a:t>
+            </a:r>
+          </a:p>
+        </p:txBody>
+      </p:sp>
       <p:sp>
         <p:nvSpPr>
           <p:cNvPr id="3" name="TextBox 2">
@@ -4423,8 +4402,8 @@
         </p:nvSpPr>
         <p:spPr>
           <a:xfrm>
-            <a:off x="21879786" y="18532105"/>
-            <a:ext cx="9144000" cy="4524315"/>
+            <a:off x="21969388" y="20312695"/>
+            <a:ext cx="9144000" cy="6670126"/>
           </a:xfrm>
           <a:prstGeom prst="rect">
             <a:avLst/>
@@ -4439,8 +4418,8 @@
           </a:ln>
         </p:spPr>
         <p:txBody>
-          <a:bodyPr wrap="square" rtlCol="0">
-            <a:spAutoFit/>
+          <a:bodyPr wrap="square" rtlCol="0" anchor="ctr" anchorCtr="0">
+            <a:normAutofit fontScale="85000" lnSpcReduction="20000"/>
           </a:bodyPr>
           <a:lstStyle/>
           <a:p>
@@ -4457,548 +4436,69 @@
           <a:p>
             <a:r>
               <a:rPr lang="en-US" sz="4800" dirty="0"/>
-              <a:t>Detector performance of both decoy and real were compared to SOA split window normalizer </a:t>
-            </a:r>
-          </a:p>
-        </p:txBody>
-      </p:sp>
-      <p:graphicFrame>
-        <p:nvGraphicFramePr>
-          <p:cNvPr id="5" name="Table 4">
-            <a:extLst>
-              <a:ext uri="{FF2B5EF4-FFF2-40B4-BE49-F238E27FC236}">
-                <a16:creationId xmlns:a16="http://schemas.microsoft.com/office/drawing/2014/main" id="{0F4DB3BB-C768-6444-86D6-1DE68E26FEA7}"/>
-              </a:ext>
-            </a:extLst>
-          </p:cNvPr>
-          <p:cNvGraphicFramePr>
-            <a:graphicFrameLocks noGrp="1"/>
-          </p:cNvGraphicFramePr>
-          <p:nvPr>
-            <p:extLst>
-              <p:ext uri="{D42A27DB-BD31-4B8C-83A1-F6EECF244321}">
-                <p14:modId xmlns:p14="http://schemas.microsoft.com/office/powerpoint/2010/main" val="3039439956"/>
-              </p:ext>
-            </p:extLst>
-          </p:nvPr>
-        </p:nvGraphicFramePr>
-        <p:xfrm>
-          <a:off x="23301986" y="23886597"/>
-          <a:ext cx="15159964" cy="4857684"/>
-        </p:xfrm>
-        <a:graphic>
-          <a:graphicData uri="http://schemas.openxmlformats.org/drawingml/2006/table">
-            <a:tbl>
-              <a:tblPr firstRow="1" bandRow="1">
-                <a:tableStyleId>{5C22544A-7EE6-4342-B048-85BDC9FD1C3A}</a:tableStyleId>
-              </a:tblPr>
-              <a:tblGrid>
-                <a:gridCol w="3789991">
-                  <a:extLst>
-                    <a:ext uri="{9D8B030D-6E8A-4147-A177-3AD203B41FA5}">
-                      <a16:colId xmlns:a16="http://schemas.microsoft.com/office/drawing/2014/main" val="1719164077"/>
-                    </a:ext>
-                  </a:extLst>
-                </a:gridCol>
-                <a:gridCol w="3789991">
-                  <a:extLst>
-                    <a:ext uri="{9D8B030D-6E8A-4147-A177-3AD203B41FA5}">
-                      <a16:colId xmlns:a16="http://schemas.microsoft.com/office/drawing/2014/main" val="3676199173"/>
-                    </a:ext>
-                  </a:extLst>
-                </a:gridCol>
-                <a:gridCol w="3789991">
-                  <a:extLst>
-                    <a:ext uri="{9D8B030D-6E8A-4147-A177-3AD203B41FA5}">
-                      <a16:colId xmlns:a16="http://schemas.microsoft.com/office/drawing/2014/main" val="3513467562"/>
-                    </a:ext>
-                  </a:extLst>
-                </a:gridCol>
-                <a:gridCol w="3789991">
-                  <a:extLst>
-                    <a:ext uri="{9D8B030D-6E8A-4147-A177-3AD203B41FA5}">
-                      <a16:colId xmlns:a16="http://schemas.microsoft.com/office/drawing/2014/main" val="2436583933"/>
-                    </a:ext>
-                  </a:extLst>
-                </a:gridCol>
-              </a:tblGrid>
-              <a:tr h="1468722">
-                <a:tc>
-                  <a:txBody>
-                    <a:bodyPr/>
-                    <a:lstStyle/>
-                    <a:p>
-                      <a:endParaRPr lang="en-US" sz="6000" dirty="0"/>
-                    </a:p>
-                  </a:txBody>
-                  <a:tcPr/>
-                </a:tc>
-                <a:tc>
-                  <a:txBody>
-                    <a:bodyPr/>
-                    <a:lstStyle/>
-                    <a:p>
-                      <a:r>
-                        <a:rPr lang="en-US" sz="6000" dirty="0"/>
-                        <a:t>True</a:t>
-                      </a:r>
-                    </a:p>
-                  </a:txBody>
-                  <a:tcPr/>
-                </a:tc>
-                <a:tc>
-                  <a:txBody>
-                    <a:bodyPr/>
-                    <a:lstStyle/>
-                    <a:p>
-                      <a:r>
-                        <a:rPr lang="en-US" sz="6000" dirty="0"/>
-                        <a:t>Decoy</a:t>
-                      </a:r>
-                    </a:p>
-                  </a:txBody>
-                  <a:tcPr/>
-                </a:tc>
-                <a:tc>
-                  <a:txBody>
-                    <a:bodyPr/>
-                    <a:lstStyle/>
-                    <a:p>
-                      <a:r>
-                        <a:rPr lang="en-US" sz="6000" dirty="0"/>
-                        <a:t>Total</a:t>
-                      </a:r>
-                    </a:p>
-                  </a:txBody>
-                  <a:tcPr/>
-                </a:tc>
-                <a:extLst>
-                  <a:ext uri="{0D108BD9-81ED-4DB2-BD59-A6C34878D82A}">
-                    <a16:rowId xmlns:a16="http://schemas.microsoft.com/office/drawing/2014/main" val="3923512006"/>
-                  </a:ext>
-                </a:extLst>
-              </a:tr>
-              <a:tr h="1468722">
-                <a:tc>
-                  <a:txBody>
-                    <a:bodyPr/>
-                    <a:lstStyle/>
-                    <a:p>
-                      <a:r>
-                        <a:rPr lang="en-US" sz="6000" dirty="0"/>
-                        <a:t>Split Window</a:t>
-                      </a:r>
-                    </a:p>
-                  </a:txBody>
-                  <a:tcPr/>
-                </a:tc>
-                <a:tc>
-                  <a:txBody>
-                    <a:bodyPr/>
-                    <a:lstStyle/>
-                    <a:p>
-                      <a:r>
-                        <a:rPr lang="en-US" sz="6000" dirty="0"/>
-                        <a:t>Work </a:t>
-                      </a:r>
-                    </a:p>
-                  </a:txBody>
-                  <a:tcPr/>
-                </a:tc>
-                <a:tc>
-                  <a:txBody>
-                    <a:bodyPr/>
-                    <a:lstStyle/>
-                    <a:p>
-                      <a:r>
-                        <a:rPr lang="en-US" sz="6000" dirty="0"/>
-                        <a:t>In</a:t>
-                      </a:r>
-                    </a:p>
-                  </a:txBody>
-                  <a:tcPr/>
-                </a:tc>
-                <a:tc>
-                  <a:txBody>
-                    <a:bodyPr/>
-                    <a:lstStyle/>
-                    <a:p>
-                      <a:r>
-                        <a:rPr lang="en-US" sz="6000" dirty="0"/>
-                        <a:t>Progress</a:t>
-                      </a:r>
-                    </a:p>
-                  </a:txBody>
-                  <a:tcPr/>
-                </a:tc>
-                <a:extLst>
-                  <a:ext uri="{0D108BD9-81ED-4DB2-BD59-A6C34878D82A}">
-                    <a16:rowId xmlns:a16="http://schemas.microsoft.com/office/drawing/2014/main" val="1523557545"/>
-                  </a:ext>
-                </a:extLst>
-              </a:tr>
-              <a:tr h="1468722">
-                <a:tc>
-                  <a:txBody>
-                    <a:bodyPr/>
-                    <a:lstStyle/>
-                    <a:p>
-                      <a:r>
-                        <a:rPr lang="en-US" sz="6000" dirty="0"/>
-                        <a:t>VGG-16</a:t>
-                      </a:r>
-                    </a:p>
-                  </a:txBody>
-                  <a:tcPr/>
-                </a:tc>
-                <a:tc>
-                  <a:txBody>
-                    <a:bodyPr/>
-                    <a:lstStyle/>
-                    <a:p>
-                      <a:endParaRPr lang="en-US" sz="6000"/>
-                    </a:p>
-                  </a:txBody>
-                  <a:tcPr/>
-                </a:tc>
-                <a:tc>
-                  <a:txBody>
-                    <a:bodyPr/>
-                    <a:lstStyle/>
-                    <a:p>
-                      <a:endParaRPr lang="en-US" sz="6000"/>
-                    </a:p>
-                  </a:txBody>
-                  <a:tcPr/>
-                </a:tc>
-                <a:tc>
-                  <a:txBody>
-                    <a:bodyPr/>
-                    <a:lstStyle/>
-                    <a:p>
-                      <a:endParaRPr lang="en-US" sz="6000" dirty="0"/>
-                    </a:p>
-                  </a:txBody>
-                  <a:tcPr/>
-                </a:tc>
-                <a:extLst>
-                  <a:ext uri="{0D108BD9-81ED-4DB2-BD59-A6C34878D82A}">
-                    <a16:rowId xmlns:a16="http://schemas.microsoft.com/office/drawing/2014/main" val="1047254246"/>
-                  </a:ext>
-                </a:extLst>
-              </a:tr>
-            </a:tbl>
-          </a:graphicData>
-        </a:graphic>
-      </p:graphicFrame>
-      <p:grpSp>
-        <p:nvGrpSpPr>
-          <p:cNvPr id="9" name="Group 8">
-            <a:extLst>
-              <a:ext uri="{FF2B5EF4-FFF2-40B4-BE49-F238E27FC236}">
-                <a16:creationId xmlns:a16="http://schemas.microsoft.com/office/drawing/2014/main" id="{7B8D8E58-D7D7-4148-AC79-89A5DF31624D}"/>
-              </a:ext>
-            </a:extLst>
-          </p:cNvPr>
-          <p:cNvGrpSpPr/>
-          <p:nvPr/>
-        </p:nvGrpSpPr>
-        <p:grpSpPr>
-          <a:xfrm>
-            <a:off x="12324117" y="22574660"/>
-            <a:ext cx="9144000" cy="6858000"/>
-            <a:chOff x="11887200" y="21475909"/>
-            <a:chExt cx="9144000" cy="6858000"/>
-          </a:xfrm>
-        </p:grpSpPr>
-        <p:pic>
-          <p:nvPicPr>
-            <p:cNvPr id="10" name="Picture 9">
-              <a:extLst>
-                <a:ext uri="{FF2B5EF4-FFF2-40B4-BE49-F238E27FC236}">
-                  <a16:creationId xmlns:a16="http://schemas.microsoft.com/office/drawing/2014/main" id="{8D536DBB-201B-2E48-B1E4-0E9BB50FDF32}"/>
-                </a:ext>
-              </a:extLst>
-            </p:cNvPr>
-            <p:cNvPicPr>
-              <a:picLocks noChangeAspect="1"/>
-            </p:cNvPicPr>
-            <p:nvPr/>
-          </p:nvPicPr>
-          <p:blipFill>
-            <a:blip r:embed="rId4"/>
-            <a:stretch>
-              <a:fillRect/>
-            </a:stretch>
-          </p:blipFill>
-          <p:spPr>
-            <a:xfrm>
-              <a:off x="11887200" y="21475909"/>
-              <a:ext cx="9144000" cy="6858000"/>
-            </a:xfrm>
-            <a:prstGeom prst="rect">
-              <a:avLst/>
-            </a:prstGeom>
-            <a:ln w="38100">
-              <a:solidFill>
-                <a:schemeClr val="accent1"/>
-              </a:solidFill>
-            </a:ln>
-          </p:spPr>
-        </p:pic>
-        <p:sp>
-          <p:nvSpPr>
-            <p:cNvPr id="12" name="TextBox 11">
-              <a:extLst>
-                <a:ext uri="{FF2B5EF4-FFF2-40B4-BE49-F238E27FC236}">
-                  <a16:creationId xmlns:a16="http://schemas.microsoft.com/office/drawing/2014/main" id="{8BCD52AA-C370-9A46-B16F-5428BC2294D0}"/>
-                </a:ext>
-              </a:extLst>
-            </p:cNvPr>
-            <p:cNvSpPr txBox="1"/>
-            <p:nvPr/>
-          </p:nvSpPr>
-          <p:spPr>
-            <a:xfrm>
-              <a:off x="15618455" y="25962531"/>
-              <a:ext cx="1292866" cy="461665"/>
-            </a:xfrm>
-            <a:prstGeom prst="rect">
-              <a:avLst/>
-            </a:prstGeom>
-            <a:noFill/>
-            <a:ln w="38100">
-              <a:solidFill>
-                <a:schemeClr val="accent1"/>
-              </a:solidFill>
-            </a:ln>
-          </p:spPr>
-          <p:txBody>
-            <a:bodyPr wrap="square" rtlCol="0">
-              <a:spAutoFit/>
-            </a:bodyPr>
-            <a:lstStyle/>
-            <a:p>
-              <a:r>
-                <a:rPr lang="en-US" sz="2400" b="1" dirty="0"/>
-                <a:t>Target</a:t>
-              </a:r>
-            </a:p>
-          </p:txBody>
-        </p:sp>
-        <p:cxnSp>
-          <p:nvCxnSpPr>
-            <p:cNvPr id="13" name="Straight Arrow Connector 12">
-              <a:extLst>
-                <a:ext uri="{FF2B5EF4-FFF2-40B4-BE49-F238E27FC236}">
-                  <a16:creationId xmlns:a16="http://schemas.microsoft.com/office/drawing/2014/main" id="{C88CD9CE-3305-7141-A1D9-F5B6E9768D96}"/>
-                </a:ext>
-              </a:extLst>
-            </p:cNvPr>
-            <p:cNvCxnSpPr>
-              <a:cxnSpLocks/>
-            </p:cNvCxnSpPr>
-            <p:nvPr/>
-          </p:nvCxnSpPr>
-          <p:spPr>
-            <a:xfrm flipH="1" flipV="1">
-              <a:off x="15186656" y="25229482"/>
-              <a:ext cx="431799" cy="486330"/>
-            </a:xfrm>
-            <a:prstGeom prst="straightConnector1">
-              <a:avLst/>
-            </a:prstGeom>
-            <a:ln w="38100">
-              <a:solidFill>
-                <a:schemeClr val="accent1"/>
-              </a:solidFill>
-              <a:tailEnd type="triangle"/>
-            </a:ln>
-          </p:spPr>
-          <p:style>
-            <a:lnRef idx="1">
-              <a:schemeClr val="accent1"/>
-            </a:lnRef>
-            <a:fillRef idx="0">
-              <a:schemeClr val="accent1"/>
-            </a:fillRef>
-            <a:effectRef idx="0">
-              <a:schemeClr val="accent1"/>
-            </a:effectRef>
-            <a:fontRef idx="minor">
-              <a:schemeClr val="tx1"/>
-            </a:fontRef>
-          </p:style>
-        </p:cxnSp>
-        <p:sp>
-          <p:nvSpPr>
-            <p:cNvPr id="23" name="TextBox 22">
-              <a:extLst>
-                <a:ext uri="{FF2B5EF4-FFF2-40B4-BE49-F238E27FC236}">
-                  <a16:creationId xmlns:a16="http://schemas.microsoft.com/office/drawing/2014/main" id="{0ADD9D1D-85C7-2D4A-AC5C-4C0074D0124D}"/>
-                </a:ext>
-              </a:extLst>
-            </p:cNvPr>
-            <p:cNvSpPr txBox="1"/>
-            <p:nvPr/>
-          </p:nvSpPr>
-          <p:spPr>
-            <a:xfrm>
-              <a:off x="14505932" y="23291389"/>
-              <a:ext cx="1292867" cy="461665"/>
-            </a:xfrm>
-            <a:prstGeom prst="rect">
-              <a:avLst/>
-            </a:prstGeom>
-            <a:noFill/>
-            <a:ln w="38100">
-              <a:solidFill>
-                <a:schemeClr val="accent1"/>
-              </a:solidFill>
-            </a:ln>
-          </p:spPr>
-          <p:txBody>
-            <a:bodyPr wrap="square" rtlCol="0">
-              <a:spAutoFit/>
-            </a:bodyPr>
-            <a:lstStyle/>
-            <a:p>
-              <a:r>
-                <a:rPr lang="en-US" sz="2400" b="1" dirty="0"/>
-                <a:t>Surface</a:t>
-              </a:r>
-            </a:p>
-          </p:txBody>
-        </p:sp>
-        <p:cxnSp>
-          <p:nvCxnSpPr>
-            <p:cNvPr id="24" name="Straight Arrow Connector 23">
-              <a:extLst>
-                <a:ext uri="{FF2B5EF4-FFF2-40B4-BE49-F238E27FC236}">
-                  <a16:creationId xmlns:a16="http://schemas.microsoft.com/office/drawing/2014/main" id="{CEEA0544-98EA-DA4C-8638-855EF8183540}"/>
-                </a:ext>
-              </a:extLst>
-            </p:cNvPr>
-            <p:cNvCxnSpPr>
-              <a:cxnSpLocks/>
-            </p:cNvCxnSpPr>
-            <p:nvPr/>
-          </p:nvCxnSpPr>
-          <p:spPr>
-            <a:xfrm flipH="1">
-              <a:off x="13936509" y="23660721"/>
-              <a:ext cx="528322" cy="729734"/>
-            </a:xfrm>
-            <a:prstGeom prst="straightConnector1">
-              <a:avLst/>
-            </a:prstGeom>
-            <a:ln w="38100">
-              <a:solidFill>
-                <a:schemeClr val="accent1"/>
-              </a:solidFill>
-              <a:tailEnd type="triangle"/>
-            </a:ln>
-          </p:spPr>
-          <p:style>
-            <a:lnRef idx="1">
-              <a:schemeClr val="accent1"/>
-            </a:lnRef>
-            <a:fillRef idx="0">
-              <a:schemeClr val="accent1"/>
-            </a:fillRef>
-            <a:effectRef idx="0">
-              <a:schemeClr val="accent1"/>
-            </a:effectRef>
-            <a:fontRef idx="minor">
-              <a:schemeClr val="tx1"/>
-            </a:fontRef>
-          </p:style>
-        </p:cxnSp>
-        <p:sp>
-          <p:nvSpPr>
-            <p:cNvPr id="42" name="TextBox 41">
-              <a:extLst>
-                <a:ext uri="{FF2B5EF4-FFF2-40B4-BE49-F238E27FC236}">
-                  <a16:creationId xmlns:a16="http://schemas.microsoft.com/office/drawing/2014/main" id="{FA55EE27-CA13-B544-8999-C3DC8F146D1B}"/>
-                </a:ext>
-              </a:extLst>
-            </p:cNvPr>
-            <p:cNvSpPr txBox="1"/>
-            <p:nvPr/>
-          </p:nvSpPr>
-          <p:spPr>
-            <a:xfrm>
-              <a:off x="16404677" y="23087690"/>
-              <a:ext cx="1292867" cy="461665"/>
-            </a:xfrm>
-            <a:prstGeom prst="rect">
-              <a:avLst/>
-            </a:prstGeom>
-            <a:noFill/>
-            <a:ln w="38100">
-              <a:solidFill>
-                <a:schemeClr val="accent1"/>
-              </a:solidFill>
-            </a:ln>
-          </p:spPr>
-          <p:txBody>
-            <a:bodyPr wrap="square" rtlCol="0">
-              <a:spAutoFit/>
-            </a:bodyPr>
-            <a:lstStyle/>
-            <a:p>
-              <a:r>
-                <a:rPr lang="en-US" sz="2400" b="1" dirty="0"/>
-                <a:t>Bottom</a:t>
-              </a:r>
-            </a:p>
-          </p:txBody>
-        </p:sp>
-        <p:cxnSp>
-          <p:nvCxnSpPr>
-            <p:cNvPr id="44" name="Straight Arrow Connector 43">
-              <a:extLst>
-                <a:ext uri="{FF2B5EF4-FFF2-40B4-BE49-F238E27FC236}">
-                  <a16:creationId xmlns:a16="http://schemas.microsoft.com/office/drawing/2014/main" id="{7B3FC26F-CCA3-4D46-989D-B98CA3D301B0}"/>
-                </a:ext>
-              </a:extLst>
-            </p:cNvPr>
-            <p:cNvCxnSpPr>
-              <a:cxnSpLocks/>
-            </p:cNvCxnSpPr>
-            <p:nvPr/>
-          </p:nvCxnSpPr>
-          <p:spPr>
-            <a:xfrm flipH="1">
-              <a:off x="15835254" y="23457022"/>
-              <a:ext cx="528322" cy="729734"/>
-            </a:xfrm>
-            <a:prstGeom prst="straightConnector1">
-              <a:avLst/>
-            </a:prstGeom>
-            <a:ln w="38100">
-              <a:solidFill>
-                <a:schemeClr val="accent1"/>
-              </a:solidFill>
-              <a:tailEnd type="triangle"/>
-            </a:ln>
-          </p:spPr>
-          <p:style>
-            <a:lnRef idx="1">
-              <a:schemeClr val="accent1"/>
-            </a:lnRef>
-            <a:fillRef idx="0">
-              <a:schemeClr val="accent1"/>
-            </a:fillRef>
-            <a:effectRef idx="0">
-              <a:schemeClr val="accent1"/>
-            </a:effectRef>
-            <a:fontRef idx="minor">
-              <a:schemeClr val="tx1"/>
-            </a:fontRef>
-          </p:style>
-        </p:cxnSp>
-      </p:grpSp>
+              <a:t>Detection defined as having an activation of &gt; 0.5 in correct frame/</a:t>
+            </a:r>
+            <a:r>
+              <a:rPr lang="en-US" sz="4800"/>
+              <a:t>bin only</a:t>
+            </a:r>
+            <a:endParaRPr lang="en-US" sz="4800" dirty="0"/>
+          </a:p>
+          <a:p>
+            <a:endParaRPr lang="en-US" sz="4800" dirty="0"/>
+          </a:p>
+          <a:p>
+            <a:r>
+              <a:rPr lang="en-US" sz="4800" dirty="0"/>
+              <a:t>Due to time limitations, </a:t>
+            </a:r>
+            <a:r>
+              <a:rPr lang="en-US" sz="4800" dirty="0" err="1"/>
+              <a:t>Pfa</a:t>
+            </a:r>
+            <a:r>
+              <a:rPr lang="en-US" sz="4800" dirty="0"/>
+              <a:t> was not calculated</a:t>
+            </a:r>
+          </a:p>
+          <a:p>
+            <a:endParaRPr lang="en-US" sz="4800" dirty="0"/>
+          </a:p>
+          <a:p>
+            <a:pPr algn="ctr"/>
+            <a:r>
+              <a:rPr lang="en-US" sz="4800" u="sng" dirty="0"/>
+              <a:t>Final Detector Performance</a:t>
+            </a:r>
+          </a:p>
+          <a:p>
+            <a:pPr algn="ctr"/>
+            <a:endParaRPr lang="en-US" sz="4800" u="sng" dirty="0"/>
+          </a:p>
+          <a:p>
+            <a:pPr algn="ctr"/>
+            <a:r>
+              <a:rPr lang="en-US" sz="4800" dirty="0" err="1"/>
+              <a:t>Pd</a:t>
+            </a:r>
+            <a:r>
+              <a:rPr lang="en-US" sz="4800" dirty="0"/>
+              <a:t> = 0.25</a:t>
+            </a:r>
+          </a:p>
+          <a:p>
+            <a:pPr algn="ctr"/>
+            <a:endParaRPr lang="en-US" sz="4800" dirty="0"/>
+          </a:p>
+          <a:p>
+            <a:pPr algn="ctr"/>
+            <a:r>
+              <a:rPr lang="en-US" sz="4800" b="1" i="1" dirty="0"/>
+              <a:t>Would Expect &gt; 0.75 from SOA SP </a:t>
+            </a:r>
+          </a:p>
+        </p:txBody>
+      </p:sp>
       <p:sp>
         <p:nvSpPr>
           <p:cNvPr id="11" name="Rectangle 10">
@@ -5013,8 +4513,8 @@
         </p:nvSpPr>
         <p:spPr>
           <a:xfrm>
-            <a:off x="21858516" y="3840480"/>
-            <a:ext cx="9144000" cy="14269734"/>
+            <a:off x="21989144" y="3840479"/>
+            <a:ext cx="9144000" cy="16160683"/>
           </a:xfrm>
           <a:prstGeom prst="rect">
             <a:avLst/>
@@ -5044,6 +4544,576 @@
           <a:p>
             <a:pPr algn="ctr"/>
             <a:endParaRPr lang="en-US"/>
+          </a:p>
+        </p:txBody>
+      </p:sp>
+      <p:pic>
+        <p:nvPicPr>
+          <p:cNvPr id="18" name="Picture 17">
+            <a:extLst>
+              <a:ext uri="{FF2B5EF4-FFF2-40B4-BE49-F238E27FC236}">
+                <a16:creationId xmlns:a16="http://schemas.microsoft.com/office/drawing/2014/main" id="{237BED27-0B12-EB4B-89EC-992E64F19F6B}"/>
+              </a:ext>
+            </a:extLst>
+          </p:cNvPr>
+          <p:cNvPicPr>
+            <a:picLocks noChangeAspect="1"/>
+          </p:cNvPicPr>
+          <p:nvPr/>
+        </p:nvPicPr>
+        <p:blipFill>
+          <a:blip r:embed="rId3"/>
+          <a:stretch>
+            <a:fillRect/>
+          </a:stretch>
+        </p:blipFill>
+        <p:spPr>
+          <a:xfrm>
+            <a:off x="12369132" y="22324842"/>
+            <a:ext cx="9144000" cy="7229475"/>
+          </a:xfrm>
+          <a:prstGeom prst="rect">
+            <a:avLst/>
+          </a:prstGeom>
+          <a:ln w="38100">
+            <a:solidFill>
+              <a:schemeClr val="accent1"/>
+            </a:solidFill>
+          </a:ln>
+        </p:spPr>
+      </p:pic>
+      <p:sp>
+        <p:nvSpPr>
+          <p:cNvPr id="19" name="TextBox 18">
+            <a:extLst>
+              <a:ext uri="{FF2B5EF4-FFF2-40B4-BE49-F238E27FC236}">
+                <a16:creationId xmlns:a16="http://schemas.microsoft.com/office/drawing/2014/main" id="{94DEFBE1-C9F4-4C40-91B8-9980A8F51A59}"/>
+              </a:ext>
+            </a:extLst>
+          </p:cNvPr>
+          <p:cNvSpPr txBox="1"/>
+          <p:nvPr/>
+        </p:nvSpPr>
+        <p:spPr>
+          <a:xfrm>
+            <a:off x="13651038" y="23596600"/>
+            <a:ext cx="914400" cy="369332"/>
+          </a:xfrm>
+          <a:prstGeom prst="rect">
+            <a:avLst/>
+          </a:prstGeom>
+          <a:noFill/>
+          <a:ln>
+            <a:solidFill>
+              <a:schemeClr val="accent1">
+                <a:shade val="50000"/>
+              </a:schemeClr>
+            </a:solidFill>
+          </a:ln>
+        </p:spPr>
+        <p:txBody>
+          <a:bodyPr wrap="square" rtlCol="0">
+            <a:spAutoFit/>
+          </a:bodyPr>
+          <a:lstStyle/>
+          <a:p>
+            <a:pPr algn="ctr"/>
+            <a:r>
+              <a:rPr lang="en-US" b="1" dirty="0"/>
+              <a:t>Surface</a:t>
+            </a:r>
+          </a:p>
+        </p:txBody>
+      </p:sp>
+      <p:sp>
+        <p:nvSpPr>
+          <p:cNvPr id="45" name="TextBox 44">
+            <a:extLst>
+              <a:ext uri="{FF2B5EF4-FFF2-40B4-BE49-F238E27FC236}">
+                <a16:creationId xmlns:a16="http://schemas.microsoft.com/office/drawing/2014/main" id="{0E3069EC-94EB-8C46-9C20-8BC77D41E9F1}"/>
+              </a:ext>
+            </a:extLst>
+          </p:cNvPr>
+          <p:cNvSpPr txBox="1"/>
+          <p:nvPr/>
+        </p:nvSpPr>
+        <p:spPr>
+          <a:xfrm>
+            <a:off x="16483932" y="24257000"/>
+            <a:ext cx="914400" cy="369332"/>
+          </a:xfrm>
+          <a:prstGeom prst="rect">
+            <a:avLst/>
+          </a:prstGeom>
+          <a:noFill/>
+          <a:ln>
+            <a:solidFill>
+              <a:schemeClr val="accent1">
+                <a:shade val="50000"/>
+              </a:schemeClr>
+            </a:solidFill>
+          </a:ln>
+        </p:spPr>
+        <p:txBody>
+          <a:bodyPr wrap="square" rtlCol="0">
+            <a:spAutoFit/>
+          </a:bodyPr>
+          <a:lstStyle/>
+          <a:p>
+            <a:pPr algn="ctr"/>
+            <a:r>
+              <a:rPr lang="en-US" b="1" dirty="0"/>
+              <a:t>Bottom</a:t>
+            </a:r>
+          </a:p>
+        </p:txBody>
+      </p:sp>
+      <p:sp>
+        <p:nvSpPr>
+          <p:cNvPr id="46" name="TextBox 45">
+            <a:extLst>
+              <a:ext uri="{FF2B5EF4-FFF2-40B4-BE49-F238E27FC236}">
+                <a16:creationId xmlns:a16="http://schemas.microsoft.com/office/drawing/2014/main" id="{D1F1A5A3-5939-4645-BC99-263208BE7B03}"/>
+              </a:ext>
+            </a:extLst>
+          </p:cNvPr>
+          <p:cNvSpPr txBox="1"/>
+          <p:nvPr/>
+        </p:nvSpPr>
+        <p:spPr>
+          <a:xfrm>
+            <a:off x="15731698" y="26485526"/>
+            <a:ext cx="914400" cy="369332"/>
+          </a:xfrm>
+          <a:prstGeom prst="rect">
+            <a:avLst/>
+          </a:prstGeom>
+          <a:noFill/>
+          <a:ln>
+            <a:solidFill>
+              <a:schemeClr val="accent1">
+                <a:shade val="50000"/>
+              </a:schemeClr>
+            </a:solidFill>
+          </a:ln>
+        </p:spPr>
+        <p:txBody>
+          <a:bodyPr wrap="square" rtlCol="0">
+            <a:spAutoFit/>
+          </a:bodyPr>
+          <a:lstStyle/>
+          <a:p>
+            <a:pPr algn="ctr"/>
+            <a:r>
+              <a:rPr lang="en-US" b="1" dirty="0"/>
+              <a:t>Target</a:t>
+            </a:r>
+          </a:p>
+        </p:txBody>
+      </p:sp>
+      <p:cxnSp>
+        <p:nvCxnSpPr>
+          <p:cNvPr id="20" name="Straight Arrow Connector 19">
+            <a:extLst>
+              <a:ext uri="{FF2B5EF4-FFF2-40B4-BE49-F238E27FC236}">
+                <a16:creationId xmlns:a16="http://schemas.microsoft.com/office/drawing/2014/main" id="{D91E5007-8B7D-1946-A489-C677266BB737}"/>
+              </a:ext>
+            </a:extLst>
+          </p:cNvPr>
+          <p:cNvCxnSpPr>
+            <a:cxnSpLocks/>
+          </p:cNvCxnSpPr>
+          <p:nvPr/>
+        </p:nvCxnSpPr>
+        <p:spPr>
+          <a:xfrm flipH="1">
+            <a:off x="13122464" y="23965932"/>
+            <a:ext cx="563590" cy="475734"/>
+          </a:xfrm>
+          <a:prstGeom prst="straightConnector1">
+            <a:avLst/>
+          </a:prstGeom>
+          <a:ln w="38100">
+            <a:headEnd type="none"/>
+            <a:tailEnd type="triangle"/>
+          </a:ln>
+        </p:spPr>
+        <p:style>
+          <a:lnRef idx="1">
+            <a:schemeClr val="accent1"/>
+          </a:lnRef>
+          <a:fillRef idx="0">
+            <a:schemeClr val="accent1"/>
+          </a:fillRef>
+          <a:effectRef idx="0">
+            <a:schemeClr val="accent1"/>
+          </a:effectRef>
+          <a:fontRef idx="minor">
+            <a:schemeClr val="tx1"/>
+          </a:fontRef>
+        </p:style>
+      </p:cxnSp>
+      <p:cxnSp>
+        <p:nvCxnSpPr>
+          <p:cNvPr id="47" name="Straight Arrow Connector 46">
+            <a:extLst>
+              <a:ext uri="{FF2B5EF4-FFF2-40B4-BE49-F238E27FC236}">
+                <a16:creationId xmlns:a16="http://schemas.microsoft.com/office/drawing/2014/main" id="{54A38C1F-3A1D-3D47-A2DE-6121945D72E2}"/>
+              </a:ext>
+            </a:extLst>
+          </p:cNvPr>
+          <p:cNvCxnSpPr>
+            <a:cxnSpLocks/>
+          </p:cNvCxnSpPr>
+          <p:nvPr/>
+        </p:nvCxnSpPr>
+        <p:spPr>
+          <a:xfrm flipH="1">
+            <a:off x="16082508" y="24633198"/>
+            <a:ext cx="563590" cy="475734"/>
+          </a:xfrm>
+          <a:prstGeom prst="straightConnector1">
+            <a:avLst/>
+          </a:prstGeom>
+          <a:ln w="38100">
+            <a:headEnd type="none"/>
+            <a:tailEnd type="triangle"/>
+          </a:ln>
+        </p:spPr>
+        <p:style>
+          <a:lnRef idx="1">
+            <a:schemeClr val="accent1"/>
+          </a:lnRef>
+          <a:fillRef idx="0">
+            <a:schemeClr val="accent1"/>
+          </a:fillRef>
+          <a:effectRef idx="0">
+            <a:schemeClr val="accent1"/>
+          </a:effectRef>
+          <a:fontRef idx="minor">
+            <a:schemeClr val="tx1"/>
+          </a:fontRef>
+        </p:style>
+      </p:cxnSp>
+      <p:cxnSp>
+        <p:nvCxnSpPr>
+          <p:cNvPr id="48" name="Straight Arrow Connector 47">
+            <a:extLst>
+              <a:ext uri="{FF2B5EF4-FFF2-40B4-BE49-F238E27FC236}">
+                <a16:creationId xmlns:a16="http://schemas.microsoft.com/office/drawing/2014/main" id="{37ABDDDF-8887-D443-BCE1-170860A1EAC7}"/>
+              </a:ext>
+            </a:extLst>
+          </p:cNvPr>
+          <p:cNvCxnSpPr>
+            <a:cxnSpLocks/>
+          </p:cNvCxnSpPr>
+          <p:nvPr/>
+        </p:nvCxnSpPr>
+        <p:spPr>
+          <a:xfrm flipH="1" flipV="1">
+            <a:off x="14938828" y="26670192"/>
+            <a:ext cx="792870" cy="1"/>
+          </a:xfrm>
+          <a:prstGeom prst="straightConnector1">
+            <a:avLst/>
+          </a:prstGeom>
+          <a:ln w="38100">
+            <a:headEnd type="none"/>
+            <a:tailEnd type="triangle"/>
+          </a:ln>
+        </p:spPr>
+        <p:style>
+          <a:lnRef idx="1">
+            <a:schemeClr val="accent1"/>
+          </a:lnRef>
+          <a:fillRef idx="0">
+            <a:schemeClr val="accent1"/>
+          </a:fillRef>
+          <a:effectRef idx="0">
+            <a:schemeClr val="accent1"/>
+          </a:effectRef>
+          <a:fontRef idx="minor">
+            <a:schemeClr val="tx1"/>
+          </a:fontRef>
+        </p:style>
+      </p:cxnSp>
+      <p:pic>
+        <p:nvPicPr>
+          <p:cNvPr id="49" name="Picture 48" descr="A picture containing screenshot&#10;&#10;Description automatically generated">
+            <a:extLst>
+              <a:ext uri="{FF2B5EF4-FFF2-40B4-BE49-F238E27FC236}">
+                <a16:creationId xmlns:a16="http://schemas.microsoft.com/office/drawing/2014/main" id="{4AD1D69E-8F4E-4845-9C9B-B82F1E12C547}"/>
+              </a:ext>
+            </a:extLst>
+          </p:cNvPr>
+          <p:cNvPicPr>
+            <a:picLocks noChangeAspect="1"/>
+          </p:cNvPicPr>
+          <p:nvPr/>
+        </p:nvPicPr>
+        <p:blipFill>
+          <a:blip r:embed="rId4"/>
+          <a:stretch>
+            <a:fillRect/>
+          </a:stretch>
+        </p:blipFill>
+        <p:spPr>
+          <a:xfrm>
+            <a:off x="31438573" y="13127120"/>
+            <a:ext cx="9144000" cy="6858000"/>
+          </a:xfrm>
+          <a:prstGeom prst="rect">
+            <a:avLst/>
+          </a:prstGeom>
+          <a:ln w="38100">
+            <a:solidFill>
+              <a:schemeClr val="accent1">
+                <a:shade val="50000"/>
+              </a:schemeClr>
+            </a:solidFill>
+          </a:ln>
+        </p:spPr>
+      </p:pic>
+      <p:pic>
+        <p:nvPicPr>
+          <p:cNvPr id="51" name="Picture 50" descr="A screenshot of a cell phone&#10;&#10;Description automatically generated">
+            <a:extLst>
+              <a:ext uri="{FF2B5EF4-FFF2-40B4-BE49-F238E27FC236}">
+                <a16:creationId xmlns:a16="http://schemas.microsoft.com/office/drawing/2014/main" id="{03D32416-24A1-3246-92AC-41046D51CE97}"/>
+              </a:ext>
+            </a:extLst>
+          </p:cNvPr>
+          <p:cNvPicPr>
+            <a:picLocks noChangeAspect="1"/>
+          </p:cNvPicPr>
+          <p:nvPr/>
+        </p:nvPicPr>
+        <p:blipFill>
+          <a:blip r:embed="rId5"/>
+          <a:stretch>
+            <a:fillRect/>
+          </a:stretch>
+        </p:blipFill>
+        <p:spPr>
+          <a:xfrm>
+            <a:off x="31453511" y="20324622"/>
+            <a:ext cx="9143999" cy="6658199"/>
+          </a:xfrm>
+          <a:prstGeom prst="rect">
+            <a:avLst/>
+          </a:prstGeom>
+          <a:ln w="38100">
+            <a:solidFill>
+              <a:schemeClr val="accent1">
+                <a:shade val="50000"/>
+              </a:schemeClr>
+            </a:solidFill>
+          </a:ln>
+        </p:spPr>
+      </p:pic>
+      <p:sp>
+        <p:nvSpPr>
+          <p:cNvPr id="52" name="Rectangle 51">
+            <a:extLst>
+              <a:ext uri="{FF2B5EF4-FFF2-40B4-BE49-F238E27FC236}">
+                <a16:creationId xmlns:a16="http://schemas.microsoft.com/office/drawing/2014/main" id="{6A36333C-327C-CE4E-80ED-55054628BD02}"/>
+              </a:ext>
+            </a:extLst>
+          </p:cNvPr>
+          <p:cNvSpPr/>
+          <p:nvPr/>
+        </p:nvSpPr>
+        <p:spPr>
+          <a:xfrm>
+            <a:off x="24047230" y="16156835"/>
+            <a:ext cx="4572000" cy="914400"/>
+          </a:xfrm>
+          <a:prstGeom prst="rect">
+            <a:avLst/>
+          </a:prstGeom>
+          <a:solidFill>
+            <a:schemeClr val="accent2">
+              <a:lumMod val="60000"/>
+              <a:lumOff val="40000"/>
+            </a:schemeClr>
+          </a:solidFill>
+        </p:spPr>
+        <p:style>
+          <a:lnRef idx="2">
+            <a:schemeClr val="accent1">
+              <a:shade val="50000"/>
+            </a:schemeClr>
+          </a:lnRef>
+          <a:fillRef idx="1">
+            <a:schemeClr val="accent1"/>
+          </a:fillRef>
+          <a:effectRef idx="0">
+            <a:schemeClr val="accent1"/>
+          </a:effectRef>
+          <a:fontRef idx="minor">
+            <a:schemeClr val="lt1"/>
+          </a:fontRef>
+        </p:style>
+        <p:txBody>
+          <a:bodyPr rtlCol="0" anchor="ctr"/>
+          <a:lstStyle/>
+          <a:p>
+            <a:pPr algn="ctr"/>
+            <a:r>
+              <a:rPr lang="en-US" dirty="0" err="1"/>
+              <a:t>ReLU</a:t>
+            </a:r>
+            <a:endParaRPr lang="en-US" dirty="0"/>
+          </a:p>
+        </p:txBody>
+      </p:sp>
+      <p:sp>
+        <p:nvSpPr>
+          <p:cNvPr id="53" name="Rectangle 52">
+            <a:extLst>
+              <a:ext uri="{FF2B5EF4-FFF2-40B4-BE49-F238E27FC236}">
+                <a16:creationId xmlns:a16="http://schemas.microsoft.com/office/drawing/2014/main" id="{AA6C1A01-319D-4440-81CF-255F313B55C5}"/>
+              </a:ext>
+            </a:extLst>
+          </p:cNvPr>
+          <p:cNvSpPr/>
+          <p:nvPr/>
+        </p:nvSpPr>
+        <p:spPr>
+          <a:xfrm>
+            <a:off x="24047230" y="17985635"/>
+            <a:ext cx="4572000" cy="914400"/>
+          </a:xfrm>
+          <a:prstGeom prst="rect">
+            <a:avLst/>
+          </a:prstGeom>
+          <a:solidFill>
+            <a:schemeClr val="accent2">
+              <a:lumMod val="60000"/>
+              <a:lumOff val="40000"/>
+            </a:schemeClr>
+          </a:solidFill>
+        </p:spPr>
+        <p:style>
+          <a:lnRef idx="2">
+            <a:schemeClr val="accent1">
+              <a:shade val="50000"/>
+            </a:schemeClr>
+          </a:lnRef>
+          <a:fillRef idx="1">
+            <a:schemeClr val="accent1"/>
+          </a:fillRef>
+          <a:effectRef idx="0">
+            <a:schemeClr val="accent1"/>
+          </a:effectRef>
+          <a:fontRef idx="minor">
+            <a:schemeClr val="lt1"/>
+          </a:fontRef>
+        </p:style>
+        <p:txBody>
+          <a:bodyPr rtlCol="0" anchor="ctr"/>
+          <a:lstStyle/>
+          <a:p>
+            <a:pPr algn="ctr"/>
+            <a:r>
+              <a:rPr lang="en-US" dirty="0"/>
+              <a:t>Sigmoid</a:t>
+            </a:r>
+          </a:p>
+        </p:txBody>
+      </p:sp>
+      <p:sp>
+        <p:nvSpPr>
+          <p:cNvPr id="54" name="TextBox 53">
+            <a:extLst>
+              <a:ext uri="{FF2B5EF4-FFF2-40B4-BE49-F238E27FC236}">
+                <a16:creationId xmlns:a16="http://schemas.microsoft.com/office/drawing/2014/main" id="{61046090-0899-7549-A797-45A8E900D3A5}"/>
+              </a:ext>
+            </a:extLst>
+          </p:cNvPr>
+          <p:cNvSpPr txBox="1"/>
+          <p:nvPr/>
+        </p:nvSpPr>
+        <p:spPr>
+          <a:xfrm>
+            <a:off x="21989144" y="27245994"/>
+            <a:ext cx="18608366" cy="2308324"/>
+          </a:xfrm>
+          <a:prstGeom prst="rect">
+            <a:avLst/>
+          </a:prstGeom>
+          <a:noFill/>
+          <a:ln w="38100">
+            <a:solidFill>
+              <a:schemeClr val="accent1">
+                <a:shade val="50000"/>
+              </a:schemeClr>
+            </a:solidFill>
+          </a:ln>
+        </p:spPr>
+        <p:txBody>
+          <a:bodyPr wrap="square" rtlCol="0" anchor="ctr" anchorCtr="0">
+            <a:normAutofit fontScale="62500" lnSpcReduction="20000"/>
+          </a:bodyPr>
+          <a:lstStyle/>
+          <a:p>
+            <a:pPr algn="ctr"/>
+            <a:r>
+              <a:rPr lang="en-US" sz="4800" u="sng" dirty="0"/>
+              <a:t>References</a:t>
+            </a:r>
+          </a:p>
+          <a:p>
+            <a:r>
+              <a:rPr lang="en-US" sz="4800" dirty="0" err="1"/>
+              <a:t>Burdic</a:t>
+            </a:r>
+            <a:r>
+              <a:rPr lang="en-US" sz="4800" dirty="0"/>
+              <a:t>, “Underwater Acoustic System Analysis 2</a:t>
+            </a:r>
+            <a:r>
+              <a:rPr lang="en-US" sz="4800" baseline="30000" dirty="0"/>
+              <a:t>nd</a:t>
+            </a:r>
+            <a:r>
+              <a:rPr lang="en-US" sz="4800" dirty="0"/>
+              <a:t> Ed”, Peninsula Publishing, 1990</a:t>
+            </a:r>
+            <a:br>
+              <a:rPr lang="en-US" sz="4800" dirty="0"/>
+            </a:br>
+            <a:r>
+              <a:rPr lang="en-US" sz="4800" dirty="0"/>
+              <a:t>Li, Johnson, Leung, “csn231 Lecture Notes”, 2018</a:t>
+            </a:r>
+            <a:br>
+              <a:rPr lang="en-US" sz="4800" dirty="0"/>
+            </a:br>
+            <a:r>
+              <a:rPr lang="en-US" sz="4800" dirty="0" err="1"/>
+              <a:t>PyTorch</a:t>
+            </a:r>
+            <a:r>
+              <a:rPr lang="en-US" sz="4800" dirty="0"/>
+              <a:t> Discussion Board, “VGG-16 Architecture”, </a:t>
+            </a:r>
+            <a:r>
+              <a:rPr lang="en-US" sz="4800" dirty="0">
+                <a:hlinkClick r:id="rId6"/>
+              </a:rPr>
+              <a:t>https://discuss.pytorch.org/t/vgg-16-architecture/27024</a:t>
+            </a:r>
+            <a:endParaRPr lang="en-US" sz="4800" dirty="0"/>
+          </a:p>
+          <a:p>
+            <a:r>
+              <a:rPr lang="en-US" sz="4800" dirty="0"/>
+              <a:t>Noh, Hong, Han, “Learning Deconvolution Network For Semantic Segmentation”, Computer Vision Foundation</a:t>
+            </a:r>
+          </a:p>
+          <a:p>
+            <a:endParaRPr lang="en-US" sz="4800" dirty="0"/>
           </a:p>
         </p:txBody>
       </p:sp>

</xml_diff>